<commit_message>
Summary:  - Finished the welcome page logic + design for now  - Fixed the entire mechanism of the navigation bar + the page view  - Edited and improved the WillPopScope to be according to the page you're in
 # Lidor
</commit_message>
<xml_diff>
--- a/YANA_SpecificationDocument.pptx
+++ b/YANA_SpecificationDocument.pptx
@@ -273,7 +273,7 @@
           <a:p>
             <a:fld id="{94B43D15-E77F-4644-B541-976CD44FBF9F}" type="datetimeFigureOut">
               <a:rPr lang="en-US" smtClean="0"/>
-              <a:t>14-Sep-20</a:t>
+              <a:t>9/27/2020</a:t>
             </a:fld>
             <a:endParaRPr lang="en-US"/>
           </a:p>
@@ -471,7 +471,7 @@
           <a:p>
             <a:fld id="{94B43D15-E77F-4644-B541-976CD44FBF9F}" type="datetimeFigureOut">
               <a:rPr lang="en-US" smtClean="0"/>
-              <a:t>14-Sep-20</a:t>
+              <a:t>9/27/2020</a:t>
             </a:fld>
             <a:endParaRPr lang="en-US"/>
           </a:p>
@@ -679,7 +679,7 @@
           <a:p>
             <a:fld id="{94B43D15-E77F-4644-B541-976CD44FBF9F}" type="datetimeFigureOut">
               <a:rPr lang="en-US" smtClean="0"/>
-              <a:t>14-Sep-20</a:t>
+              <a:t>9/27/2020</a:t>
             </a:fld>
             <a:endParaRPr lang="en-US"/>
           </a:p>
@@ -877,7 +877,7 @@
           <a:p>
             <a:fld id="{94B43D15-E77F-4644-B541-976CD44FBF9F}" type="datetimeFigureOut">
               <a:rPr lang="en-US" smtClean="0"/>
-              <a:t>14-Sep-20</a:t>
+              <a:t>9/27/2020</a:t>
             </a:fld>
             <a:endParaRPr lang="en-US"/>
           </a:p>
@@ -1152,7 +1152,7 @@
           <a:p>
             <a:fld id="{94B43D15-E77F-4644-B541-976CD44FBF9F}" type="datetimeFigureOut">
               <a:rPr lang="en-US" smtClean="0"/>
-              <a:t>14-Sep-20</a:t>
+              <a:t>9/27/2020</a:t>
             </a:fld>
             <a:endParaRPr lang="en-US"/>
           </a:p>
@@ -1417,7 +1417,7 @@
           <a:p>
             <a:fld id="{94B43D15-E77F-4644-B541-976CD44FBF9F}" type="datetimeFigureOut">
               <a:rPr lang="en-US" smtClean="0"/>
-              <a:t>14-Sep-20</a:t>
+              <a:t>9/27/2020</a:t>
             </a:fld>
             <a:endParaRPr lang="en-US"/>
           </a:p>
@@ -1829,7 +1829,7 @@
           <a:p>
             <a:fld id="{94B43D15-E77F-4644-B541-976CD44FBF9F}" type="datetimeFigureOut">
               <a:rPr lang="en-US" smtClean="0"/>
-              <a:t>14-Sep-20</a:t>
+              <a:t>9/27/2020</a:t>
             </a:fld>
             <a:endParaRPr lang="en-US"/>
           </a:p>
@@ -1970,7 +1970,7 @@
           <a:p>
             <a:fld id="{94B43D15-E77F-4644-B541-976CD44FBF9F}" type="datetimeFigureOut">
               <a:rPr lang="en-US" smtClean="0"/>
-              <a:t>14-Sep-20</a:t>
+              <a:t>9/27/2020</a:t>
             </a:fld>
             <a:endParaRPr lang="en-US"/>
           </a:p>
@@ -2083,7 +2083,7 @@
           <a:p>
             <a:fld id="{94B43D15-E77F-4644-B541-976CD44FBF9F}" type="datetimeFigureOut">
               <a:rPr lang="en-US" smtClean="0"/>
-              <a:t>14-Sep-20</a:t>
+              <a:t>9/27/2020</a:t>
             </a:fld>
             <a:endParaRPr lang="en-US"/>
           </a:p>
@@ -2394,7 +2394,7 @@
           <a:p>
             <a:fld id="{94B43D15-E77F-4644-B541-976CD44FBF9F}" type="datetimeFigureOut">
               <a:rPr lang="en-US" smtClean="0"/>
-              <a:t>14-Sep-20</a:t>
+              <a:t>9/27/2020</a:t>
             </a:fld>
             <a:endParaRPr lang="en-US"/>
           </a:p>
@@ -2682,7 +2682,7 @@
           <a:p>
             <a:fld id="{94B43D15-E77F-4644-B541-976CD44FBF9F}" type="datetimeFigureOut">
               <a:rPr lang="en-US" smtClean="0"/>
-              <a:t>14-Sep-20</a:t>
+              <a:t>9/27/2020</a:t>
             </a:fld>
             <a:endParaRPr lang="en-US"/>
           </a:p>
@@ -2923,7 +2923,7 @@
           <a:p>
             <a:fld id="{94B43D15-E77F-4644-B541-976CD44FBF9F}" type="datetimeFigureOut">
               <a:rPr lang="en-US" smtClean="0"/>
-              <a:t>14-Sep-20</a:t>
+              <a:t>9/27/2020</a:t>
             </a:fld>
             <a:endParaRPr lang="en-US"/>
           </a:p>
@@ -10399,7 +10399,7 @@
         </p:nvSpPr>
         <p:spPr>
           <a:xfrm>
-            <a:off x="8056593" y="1155779"/>
+            <a:off x="8056592" y="1371057"/>
             <a:ext cx="2790334" cy="4926928"/>
           </a:xfrm>
           <a:prstGeom prst="rect">
@@ -10533,7 +10533,7 @@
         </p:blipFill>
         <p:spPr>
           <a:xfrm>
-            <a:off x="8406849" y="2038020"/>
+            <a:off x="8377665" y="1634787"/>
             <a:ext cx="2148189" cy="2148189"/>
           </a:xfrm>
           <a:prstGeom prst="rect">
@@ -10541,6 +10541,96 @@
           </a:prstGeom>
         </p:spPr>
       </p:pic>
+      <p:sp>
+        <p:nvSpPr>
+          <p:cNvPr id="3" name="TextBox 2">
+            <a:extLst>
+              <a:ext uri="{FF2B5EF4-FFF2-40B4-BE49-F238E27FC236}">
+                <a16:creationId xmlns:a16="http://schemas.microsoft.com/office/drawing/2014/main" id="{F605B9E2-2F11-4584-8F2E-2C2669F586FF}"/>
+              </a:ext>
+            </a:extLst>
+          </p:cNvPr>
+          <p:cNvSpPr txBox="1"/>
+          <p:nvPr/>
+        </p:nvSpPr>
+        <p:spPr>
+          <a:xfrm>
+            <a:off x="8888027" y="4071955"/>
+            <a:ext cx="1127464" cy="369332"/>
+          </a:xfrm>
+          <a:prstGeom prst="rect">
+            <a:avLst/>
+          </a:prstGeom>
+          <a:noFill/>
+          <a:ln w="38100">
+            <a:solidFill>
+              <a:schemeClr val="bg1"/>
+            </a:solidFill>
+          </a:ln>
+        </p:spPr>
+        <p:txBody>
+          <a:bodyPr wrap="square" rtlCol="0">
+            <a:spAutoFit/>
+          </a:bodyPr>
+          <a:lstStyle/>
+          <a:p>
+            <a:pPr algn="ctr"/>
+            <a:r>
+              <a:rPr lang="en-US" dirty="0">
+                <a:solidFill>
+                  <a:schemeClr val="bg1"/>
+                </a:solidFill>
+              </a:rPr>
+              <a:t>Sign In</a:t>
+            </a:r>
+          </a:p>
+        </p:txBody>
+      </p:sp>
+      <p:sp>
+        <p:nvSpPr>
+          <p:cNvPr id="8" name="TextBox 7">
+            <a:extLst>
+              <a:ext uri="{FF2B5EF4-FFF2-40B4-BE49-F238E27FC236}">
+                <a16:creationId xmlns:a16="http://schemas.microsoft.com/office/drawing/2014/main" id="{65A2D1C6-C038-4A4C-92A6-241452840724}"/>
+              </a:ext>
+            </a:extLst>
+          </p:cNvPr>
+          <p:cNvSpPr txBox="1"/>
+          <p:nvPr/>
+        </p:nvSpPr>
+        <p:spPr>
+          <a:xfrm>
+            <a:off x="8888027" y="4730266"/>
+            <a:ext cx="1127464" cy="369332"/>
+          </a:xfrm>
+          <a:prstGeom prst="rect">
+            <a:avLst/>
+          </a:prstGeom>
+          <a:noFill/>
+          <a:ln w="38100">
+            <a:solidFill>
+              <a:schemeClr val="bg1"/>
+            </a:solidFill>
+          </a:ln>
+        </p:spPr>
+        <p:txBody>
+          <a:bodyPr wrap="square" rtlCol="0">
+            <a:spAutoFit/>
+          </a:bodyPr>
+          <a:lstStyle/>
+          <a:p>
+            <a:pPr algn="ctr"/>
+            <a:r>
+              <a:rPr lang="en-US" dirty="0">
+                <a:solidFill>
+                  <a:schemeClr val="bg1"/>
+                </a:solidFill>
+              </a:rPr>
+              <a:t>Log In</a:t>
+            </a:r>
+          </a:p>
+        </p:txBody>
+      </p:sp>
     </p:spTree>
     <p:extLst>
       <p:ext uri="{BB962C8B-B14F-4D97-AF65-F5344CB8AC3E}">

</xml_diff>

<commit_message>
Summary:  - YANA_SpecificationDocument.pptx improved and fixed and edited
 # Lidor
</commit_message>
<xml_diff>
--- a/YANA_SpecificationDocument.pptx
+++ b/YANA_SpecificationDocument.pptx
@@ -13,13 +13,14 @@
     <p:sldId id="261" r:id="rId7"/>
     <p:sldId id="262" r:id="rId8"/>
     <p:sldId id="263" r:id="rId9"/>
-    <p:sldId id="264" r:id="rId10"/>
+    <p:sldId id="271" r:id="rId10"/>
     <p:sldId id="265" r:id="rId11"/>
     <p:sldId id="267" r:id="rId12"/>
     <p:sldId id="266" r:id="rId13"/>
     <p:sldId id="268" r:id="rId14"/>
-    <p:sldId id="269" r:id="rId15"/>
-    <p:sldId id="270" r:id="rId16"/>
+    <p:sldId id="272" r:id="rId15"/>
+    <p:sldId id="269" r:id="rId16"/>
+    <p:sldId id="270" r:id="rId17"/>
   </p:sldIdLst>
   <p:sldSz cx="12192000" cy="6858000"/>
   <p:notesSz cx="6858000" cy="9144000"/>
@@ -273,7 +274,7 @@
           <a:p>
             <a:fld id="{94B43D15-E77F-4644-B541-976CD44FBF9F}" type="datetimeFigureOut">
               <a:rPr lang="en-US" smtClean="0"/>
-              <a:t>9/27/2020</a:t>
+              <a:t>10/6/2020</a:t>
             </a:fld>
             <a:endParaRPr lang="en-US"/>
           </a:p>
@@ -471,7 +472,7 @@
           <a:p>
             <a:fld id="{94B43D15-E77F-4644-B541-976CD44FBF9F}" type="datetimeFigureOut">
               <a:rPr lang="en-US" smtClean="0"/>
-              <a:t>9/27/2020</a:t>
+              <a:t>10/6/2020</a:t>
             </a:fld>
             <a:endParaRPr lang="en-US"/>
           </a:p>
@@ -679,7 +680,7 @@
           <a:p>
             <a:fld id="{94B43D15-E77F-4644-B541-976CD44FBF9F}" type="datetimeFigureOut">
               <a:rPr lang="en-US" smtClean="0"/>
-              <a:t>9/27/2020</a:t>
+              <a:t>10/6/2020</a:t>
             </a:fld>
             <a:endParaRPr lang="en-US"/>
           </a:p>
@@ -877,7 +878,7 @@
           <a:p>
             <a:fld id="{94B43D15-E77F-4644-B541-976CD44FBF9F}" type="datetimeFigureOut">
               <a:rPr lang="en-US" smtClean="0"/>
-              <a:t>9/27/2020</a:t>
+              <a:t>10/6/2020</a:t>
             </a:fld>
             <a:endParaRPr lang="en-US"/>
           </a:p>
@@ -1152,7 +1153,7 @@
           <a:p>
             <a:fld id="{94B43D15-E77F-4644-B541-976CD44FBF9F}" type="datetimeFigureOut">
               <a:rPr lang="en-US" smtClean="0"/>
-              <a:t>9/27/2020</a:t>
+              <a:t>10/6/2020</a:t>
             </a:fld>
             <a:endParaRPr lang="en-US"/>
           </a:p>
@@ -1417,7 +1418,7 @@
           <a:p>
             <a:fld id="{94B43D15-E77F-4644-B541-976CD44FBF9F}" type="datetimeFigureOut">
               <a:rPr lang="en-US" smtClean="0"/>
-              <a:t>9/27/2020</a:t>
+              <a:t>10/6/2020</a:t>
             </a:fld>
             <a:endParaRPr lang="en-US"/>
           </a:p>
@@ -1829,7 +1830,7 @@
           <a:p>
             <a:fld id="{94B43D15-E77F-4644-B541-976CD44FBF9F}" type="datetimeFigureOut">
               <a:rPr lang="en-US" smtClean="0"/>
-              <a:t>9/27/2020</a:t>
+              <a:t>10/6/2020</a:t>
             </a:fld>
             <a:endParaRPr lang="en-US"/>
           </a:p>
@@ -1970,7 +1971,7 @@
           <a:p>
             <a:fld id="{94B43D15-E77F-4644-B541-976CD44FBF9F}" type="datetimeFigureOut">
               <a:rPr lang="en-US" smtClean="0"/>
-              <a:t>9/27/2020</a:t>
+              <a:t>10/6/2020</a:t>
             </a:fld>
             <a:endParaRPr lang="en-US"/>
           </a:p>
@@ -2083,7 +2084,7 @@
           <a:p>
             <a:fld id="{94B43D15-E77F-4644-B541-976CD44FBF9F}" type="datetimeFigureOut">
               <a:rPr lang="en-US" smtClean="0"/>
-              <a:t>9/27/2020</a:t>
+              <a:t>10/6/2020</a:t>
             </a:fld>
             <a:endParaRPr lang="en-US"/>
           </a:p>
@@ -2394,7 +2395,7 @@
           <a:p>
             <a:fld id="{94B43D15-E77F-4644-B541-976CD44FBF9F}" type="datetimeFigureOut">
               <a:rPr lang="en-US" smtClean="0"/>
-              <a:t>9/27/2020</a:t>
+              <a:t>10/6/2020</a:t>
             </a:fld>
             <a:endParaRPr lang="en-US"/>
           </a:p>
@@ -2682,7 +2683,7 @@
           <a:p>
             <a:fld id="{94B43D15-E77F-4644-B541-976CD44FBF9F}" type="datetimeFigureOut">
               <a:rPr lang="en-US" smtClean="0"/>
-              <a:t>9/27/2020</a:t>
+              <a:t>10/6/2020</a:t>
             </a:fld>
             <a:endParaRPr lang="en-US"/>
           </a:p>
@@ -2923,7 +2924,7 @@
           <a:p>
             <a:fld id="{94B43D15-E77F-4644-B541-976CD44FBF9F}" type="datetimeFigureOut">
               <a:rPr lang="en-US" smtClean="0"/>
-              <a:t>9/27/2020</a:t>
+              <a:t>10/6/2020</a:t>
             </a:fld>
             <a:endParaRPr lang="en-US"/>
           </a:p>
@@ -3454,10 +3455,26 @@
           <a:p>
             <a:pPr algn="ctr" rtl="1"/>
             <a:r>
-              <a:rPr lang="he-IL" dirty="0"/>
-              <a:t>רישום</a:t>
-            </a:r>
-            <a:endParaRPr lang="en-US" dirty="0"/>
+              <a:rPr lang="he-IL" b="1" u="sng" dirty="0">
+                <a:effectLst>
+                  <a:outerShdw blurRad="38100" dist="38100" dir="2700000" algn="tl">
+                    <a:srgbClr val="000000">
+                      <a:alpha val="43137"/>
+                    </a:srgbClr>
+                  </a:outerShdw>
+                </a:effectLst>
+              </a:rPr>
+              <a:t>מסך רישום</a:t>
+            </a:r>
+            <a:endParaRPr lang="en-US" b="1" u="sng" dirty="0">
+              <a:effectLst>
+                <a:outerShdw blurRad="38100" dist="38100" dir="2700000" algn="tl">
+                  <a:srgbClr val="000000">
+                    <a:alpha val="43137"/>
+                  </a:srgbClr>
+                </a:outerShdw>
+              </a:effectLst>
+            </a:endParaRPr>
           </a:p>
         </p:txBody>
       </p:sp>
@@ -3475,7 +3492,7 @@
         </p:nvSpPr>
         <p:spPr>
           <a:xfrm>
-            <a:off x="8152886" y="1269507"/>
+            <a:off x="5853568" y="1269507"/>
             <a:ext cx="2790334" cy="4926928"/>
           </a:xfrm>
           <a:prstGeom prst="rect">
@@ -3529,8 +3546,8 @@
         </p:nvSpPr>
         <p:spPr>
           <a:xfrm>
-            <a:off x="1428481" y="1416830"/>
-            <a:ext cx="3614036" cy="2031325"/>
+            <a:off x="1428480" y="1416830"/>
+            <a:ext cx="3791589" cy="3693319"/>
           </a:xfrm>
           <a:prstGeom prst="rect">
             <a:avLst/>
@@ -3548,35 +3565,81 @@
               <a:rPr lang="he-IL" dirty="0"/>
               <a:t>פונקציונליות:</a:t>
             </a:r>
+            <a:endParaRPr lang="en-GB" dirty="0"/>
+          </a:p>
+          <a:p>
+            <a:pPr algn="r" rtl="1"/>
+            <a:r>
+              <a:rPr lang="he-IL" dirty="0"/>
+              <a:t>- </a:t>
+            </a:r>
             <a:endParaRPr lang="en-US" dirty="0"/>
           </a:p>
           <a:p>
             <a:pPr algn="r" rtl="1"/>
             <a:r>
               <a:rPr lang="he-IL" dirty="0"/>
-              <a:t> - מילוי שדות</a:t>
-            </a:r>
-            <a:endParaRPr lang="he-IL" b="1" dirty="0"/>
+              <a:t>- לבדוק שהשדות מולאו כראוי</a:t>
+            </a:r>
           </a:p>
           <a:p>
             <a:pPr algn="r" rtl="1"/>
             <a:r>
               <a:rPr lang="he-IL" dirty="0"/>
-              <a:t> - - להחליט מה השדות חובה</a:t>
+              <a:t> - אם יוזר מתנדב, נשדרג לו את היוזר בהמשך במסך הגדרות ע"י קוד שנשלח לו</a:t>
             </a:r>
           </a:p>
           <a:p>
             <a:pPr algn="r" rtl="1"/>
-            <a:r>
-              <a:rPr lang="he-IL" dirty="0"/>
-              <a:t> - לבדוק שהשדות מולאו כראוי</a:t>
-            </a:r>
+            <a:endParaRPr lang="he-IL" dirty="0"/>
           </a:p>
           <a:p>
             <a:pPr algn="r" rtl="1"/>
             <a:r>
               <a:rPr lang="he-IL" dirty="0"/>
-              <a:t> - אם יוזר מתנדב, נשדרג לו את היוזר בהמשך במסך הגדרות ע"י קוד שנשלח לו</a:t>
+              <a:t> - מין : </a:t>
+            </a:r>
+            <a:br>
+              <a:rPr lang="en-US" dirty="0"/>
+            </a:br>
+            <a:r>
+              <a:rPr lang="he-IL" dirty="0"/>
+              <a:t>       זכר נקבה מעדיף לא לומר ואחר</a:t>
+            </a:r>
+          </a:p>
+          <a:p>
+            <a:pPr algn="r" rtl="1"/>
+            <a:r>
+              <a:rPr lang="he-IL" dirty="0"/>
+              <a:t> - דיאלוג לתמצית:</a:t>
+            </a:r>
+          </a:p>
+          <a:p>
+            <a:pPr algn="r" rtl="1"/>
+            <a:r>
+              <a:rPr lang="he-IL" dirty="0"/>
+              <a:t>       פתיחת דיאלוג שבתוכו המשתמש</a:t>
+            </a:r>
+            <a:br>
+              <a:rPr lang="en-US" dirty="0"/>
+            </a:br>
+            <a:r>
+              <a:rPr lang="he-IL" dirty="0"/>
+              <a:t>       יכתוב את התמצית על עצמו, וילחץ</a:t>
+            </a:r>
+            <a:br>
+              <a:rPr lang="en-US" dirty="0"/>
+            </a:br>
+            <a:r>
+              <a:rPr lang="he-IL" dirty="0"/>
+              <a:t>       אישור שיגרור שמירה והנחתו</a:t>
+            </a:r>
+            <a:br>
+              <a:rPr lang="en-US" dirty="0"/>
+            </a:br>
+            <a:r>
+              <a:rPr lang="he-IL" dirty="0"/>
+              <a:t>       מבחינתנו</a:t>
             </a:r>
           </a:p>
         </p:txBody>
@@ -3595,7 +3658,7 @@
         </p:nvSpPr>
         <p:spPr>
           <a:xfrm>
-            <a:off x="8293015" y="1407953"/>
+            <a:off x="5993697" y="1407953"/>
             <a:ext cx="2520799" cy="4245300"/>
           </a:xfrm>
           <a:prstGeom prst="roundRect">
@@ -3624,7 +3687,7 @@
           <a:lstStyle/>
           <a:p>
             <a:pPr algn="ctr"/>
-            <a:endParaRPr lang="en-US"/>
+            <a:endParaRPr lang="en-US" dirty="0"/>
           </a:p>
         </p:txBody>
       </p:sp>
@@ -3642,7 +3705,7 @@
         </p:nvSpPr>
         <p:spPr>
           <a:xfrm>
-            <a:off x="8963146" y="5645121"/>
+            <a:off x="6663828" y="5645121"/>
             <a:ext cx="1242874" cy="369332"/>
           </a:xfrm>
           <a:prstGeom prst="rect">
@@ -3699,7 +3762,7 @@
         </p:nvSpPr>
         <p:spPr>
           <a:xfrm>
-            <a:off x="8664613" y="4153831"/>
+            <a:off x="6378722" y="3820451"/>
             <a:ext cx="1740023" cy="435006"/>
           </a:xfrm>
           <a:prstGeom prst="rect">
@@ -3738,7 +3801,7 @@
                   </a:schemeClr>
                 </a:solidFill>
               </a:rPr>
-              <a:t>שדות למילוי</a:t>
+              <a:t>דיאלוג לתמצית</a:t>
             </a:r>
             <a:endParaRPr lang="en-US" dirty="0">
               <a:solidFill>
@@ -3764,7 +3827,7 @@
         </p:nvSpPr>
         <p:spPr>
           <a:xfrm>
-            <a:off x="8664613" y="2862208"/>
+            <a:off x="6378723" y="2396699"/>
             <a:ext cx="1740023" cy="435006"/>
           </a:xfrm>
           <a:prstGeom prst="rect">
@@ -3803,7 +3866,7 @@
                   </a:schemeClr>
                 </a:solidFill>
               </a:rPr>
-              <a:t>שדות למילוי</a:t>
+              <a:t>גיל</a:t>
             </a:r>
             <a:endParaRPr lang="en-US" dirty="0">
               <a:solidFill>
@@ -3829,7 +3892,7 @@
         </p:nvSpPr>
         <p:spPr>
           <a:xfrm>
-            <a:off x="8662770" y="2182366"/>
+            <a:off x="6415253" y="1684823"/>
             <a:ext cx="1740023" cy="435006"/>
           </a:xfrm>
           <a:prstGeom prst="rect">
@@ -3868,7 +3931,7 @@
                   </a:schemeClr>
                 </a:solidFill>
               </a:rPr>
-              <a:t>שדות למילוי</a:t>
+              <a:t>שם / כינוי</a:t>
             </a:r>
             <a:endParaRPr lang="en-US" dirty="0">
               <a:solidFill>
@@ -3894,7 +3957,7 @@
         </p:nvSpPr>
         <p:spPr>
           <a:xfrm>
-            <a:off x="8666105" y="3478567"/>
+            <a:off x="6378722" y="3108575"/>
             <a:ext cx="1740023" cy="435006"/>
           </a:xfrm>
           <a:prstGeom prst="rect">
@@ -3933,7 +3996,7 @@
                   </a:schemeClr>
                 </a:solidFill>
               </a:rPr>
-              <a:t>שדות למילוי</a:t>
+              <a:t>מין</a:t>
             </a:r>
             <a:endParaRPr lang="en-US" dirty="0">
               <a:solidFill>
@@ -3959,7 +4022,7 @@
         </p:nvSpPr>
         <p:spPr>
           <a:xfrm>
-            <a:off x="10316652" y="5770741"/>
+            <a:off x="8017334" y="5770741"/>
             <a:ext cx="479406" cy="291287"/>
           </a:xfrm>
           <a:prstGeom prst="rightArrow">
@@ -4008,7 +4071,7 @@
         </p:nvSpPr>
         <p:spPr>
           <a:xfrm rot="10800000">
-            <a:off x="8275259" y="5774145"/>
+            <a:off x="5975941" y="5774145"/>
             <a:ext cx="504195" cy="304800"/>
           </a:xfrm>
           <a:prstGeom prst="rightArrow">
@@ -4043,6 +4106,361 @@
           </a:p>
         </p:txBody>
       </p:sp>
+      <p:sp>
+        <p:nvSpPr>
+          <p:cNvPr id="17" name="Rectangle: Rounded Corners 16">
+            <a:extLst>
+              <a:ext uri="{FF2B5EF4-FFF2-40B4-BE49-F238E27FC236}">
+                <a16:creationId xmlns:a16="http://schemas.microsoft.com/office/drawing/2014/main" id="{94B18F83-BECF-4838-8C5B-269D3F7E64BF}"/>
+              </a:ext>
+            </a:extLst>
+          </p:cNvPr>
+          <p:cNvSpPr/>
+          <p:nvPr/>
+        </p:nvSpPr>
+        <p:spPr>
+          <a:xfrm>
+            <a:off x="9219041" y="1727437"/>
+            <a:ext cx="2520799" cy="2085807"/>
+          </a:xfrm>
+          <a:prstGeom prst="roundRect">
+            <a:avLst/>
+          </a:prstGeom>
+          <a:solidFill>
+            <a:srgbClr val="7030A0"/>
+          </a:solidFill>
+        </p:spPr>
+        <p:style>
+          <a:lnRef idx="0">
+            <a:schemeClr val="accent5"/>
+          </a:lnRef>
+          <a:fillRef idx="3">
+            <a:schemeClr val="accent5"/>
+          </a:fillRef>
+          <a:effectRef idx="3">
+            <a:schemeClr val="accent5"/>
+          </a:effectRef>
+          <a:fontRef idx="minor">
+            <a:schemeClr val="lt1"/>
+          </a:fontRef>
+        </p:style>
+        <p:txBody>
+          <a:bodyPr rtlCol="0" anchor="ctr"/>
+          <a:lstStyle/>
+          <a:p>
+            <a:pPr algn="ctr"/>
+            <a:r>
+              <a:rPr lang="he-IL" dirty="0"/>
+              <a:t>דיאלוג לתמצית</a:t>
+            </a:r>
+          </a:p>
+          <a:p>
+            <a:pPr algn="ctr"/>
+            <a:r>
+              <a:rPr lang="he-IL" dirty="0"/>
+              <a:t>נראות איך שאנו נבחר</a:t>
+            </a:r>
+            <a:endParaRPr lang="en-US" dirty="0"/>
+          </a:p>
+        </p:txBody>
+      </p:sp>
+      <p:cxnSp>
+        <p:nvCxnSpPr>
+          <p:cNvPr id="10" name="Connector: Elbow 9">
+            <a:extLst>
+              <a:ext uri="{FF2B5EF4-FFF2-40B4-BE49-F238E27FC236}">
+                <a16:creationId xmlns:a16="http://schemas.microsoft.com/office/drawing/2014/main" id="{521828D1-86F4-4826-AAE6-FEB4EB70BCB1}"/>
+              </a:ext>
+            </a:extLst>
+          </p:cNvPr>
+          <p:cNvCxnSpPr>
+            <a:stCxn id="5" idx="3"/>
+            <a:endCxn id="17" idx="3"/>
+          </p:cNvCxnSpPr>
+          <p:nvPr/>
+        </p:nvCxnSpPr>
+        <p:spPr>
+          <a:xfrm flipV="1">
+            <a:off x="8118745" y="2770341"/>
+            <a:ext cx="3621095" cy="1267613"/>
+          </a:xfrm>
+          <a:prstGeom prst="bentConnector3">
+            <a:avLst>
+              <a:gd name="adj1" fmla="val 106313"/>
+            </a:avLst>
+          </a:prstGeom>
+          <a:ln w="38100">
+            <a:solidFill>
+              <a:schemeClr val="tx1"/>
+            </a:solidFill>
+            <a:tailEnd type="triangle"/>
+          </a:ln>
+        </p:spPr>
+        <p:style>
+          <a:lnRef idx="1">
+            <a:schemeClr val="accent1"/>
+          </a:lnRef>
+          <a:fillRef idx="0">
+            <a:schemeClr val="accent1"/>
+          </a:fillRef>
+          <a:effectRef idx="0">
+            <a:schemeClr val="accent1"/>
+          </a:effectRef>
+          <a:fontRef idx="minor">
+            <a:schemeClr val="tx1"/>
+          </a:fontRef>
+        </p:style>
+      </p:cxnSp>
+      <p:sp>
+        <p:nvSpPr>
+          <p:cNvPr id="21" name="Rectangle: Rounded Corners 20">
+            <a:extLst>
+              <a:ext uri="{FF2B5EF4-FFF2-40B4-BE49-F238E27FC236}">
+                <a16:creationId xmlns:a16="http://schemas.microsoft.com/office/drawing/2014/main" id="{9847D507-68FC-4D20-A7C6-54F2FFFC5882}"/>
+              </a:ext>
+            </a:extLst>
+          </p:cNvPr>
+          <p:cNvSpPr/>
+          <p:nvPr/>
+        </p:nvSpPr>
+        <p:spPr>
+          <a:xfrm>
+            <a:off x="6300324" y="4666933"/>
+            <a:ext cx="1399061" cy="435006"/>
+          </a:xfrm>
+          <a:prstGeom prst="roundRect">
+            <a:avLst/>
+          </a:prstGeom>
+          <a:solidFill>
+            <a:schemeClr val="accent4">
+              <a:lumMod val="75000"/>
+            </a:schemeClr>
+          </a:solidFill>
+        </p:spPr>
+        <p:style>
+          <a:lnRef idx="0">
+            <a:schemeClr val="accent5"/>
+          </a:lnRef>
+          <a:fillRef idx="3">
+            <a:schemeClr val="accent5"/>
+          </a:fillRef>
+          <a:effectRef idx="3">
+            <a:schemeClr val="accent5"/>
+          </a:effectRef>
+          <a:fontRef idx="minor">
+            <a:schemeClr val="lt1"/>
+          </a:fontRef>
+        </p:style>
+        <p:txBody>
+          <a:bodyPr rtlCol="0" anchor="ctr"/>
+          <a:lstStyle/>
+          <a:p>
+            <a:pPr algn="ctr"/>
+            <a:r>
+              <a:rPr lang="he-IL" sz="1400" dirty="0"/>
+              <a:t>אני מאשר ומקבל תנאי משתמש</a:t>
+            </a:r>
+            <a:endParaRPr lang="en-US" sz="1400" dirty="0"/>
+          </a:p>
+        </p:txBody>
+      </p:sp>
+      <p:sp>
+        <p:nvSpPr>
+          <p:cNvPr id="23" name="TextBox 22">
+            <a:extLst>
+              <a:ext uri="{FF2B5EF4-FFF2-40B4-BE49-F238E27FC236}">
+                <a16:creationId xmlns:a16="http://schemas.microsoft.com/office/drawing/2014/main" id="{528A66B4-2357-448C-BCA8-4FA066B0F38C}"/>
+              </a:ext>
+            </a:extLst>
+          </p:cNvPr>
+          <p:cNvSpPr txBox="1"/>
+          <p:nvPr/>
+        </p:nvSpPr>
+        <p:spPr>
+          <a:xfrm>
+            <a:off x="7677312" y="4666932"/>
+            <a:ext cx="458780" cy="461665"/>
+          </a:xfrm>
+          <a:prstGeom prst="rect">
+            <a:avLst/>
+          </a:prstGeom>
+          <a:noFill/>
+        </p:spPr>
+        <p:txBody>
+          <a:bodyPr wrap="none" rtlCol="0">
+            <a:spAutoFit/>
+          </a:bodyPr>
+          <a:lstStyle/>
+          <a:p>
+            <a:r>
+              <a:rPr lang="en-US" sz="2400" dirty="0">
+                <a:sym typeface="Wingdings" panose="05000000000000000000" pitchFamily="2" charset="2"/>
+              </a:rPr>
+              <a:t></a:t>
+            </a:r>
+            <a:endParaRPr lang="en-US" sz="2400" dirty="0"/>
+          </a:p>
+        </p:txBody>
+      </p:sp>
+      <p:sp>
+        <p:nvSpPr>
+          <p:cNvPr id="25" name="Rectangle: Rounded Corners 24">
+            <a:extLst>
+              <a:ext uri="{FF2B5EF4-FFF2-40B4-BE49-F238E27FC236}">
+                <a16:creationId xmlns:a16="http://schemas.microsoft.com/office/drawing/2014/main" id="{D0133B36-AB80-4231-A7BF-37CBE41F31B6}"/>
+              </a:ext>
+            </a:extLst>
+          </p:cNvPr>
+          <p:cNvSpPr/>
+          <p:nvPr/>
+        </p:nvSpPr>
+        <p:spPr>
+          <a:xfrm>
+            <a:off x="9288496" y="4208865"/>
+            <a:ext cx="2127861" cy="1485116"/>
+          </a:xfrm>
+          <a:prstGeom prst="roundRect">
+            <a:avLst/>
+          </a:prstGeom>
+          <a:solidFill>
+            <a:schemeClr val="accent4">
+              <a:lumMod val="75000"/>
+            </a:schemeClr>
+          </a:solidFill>
+        </p:spPr>
+        <p:style>
+          <a:lnRef idx="0">
+            <a:schemeClr val="accent5"/>
+          </a:lnRef>
+          <a:fillRef idx="3">
+            <a:schemeClr val="accent5"/>
+          </a:fillRef>
+          <a:effectRef idx="3">
+            <a:schemeClr val="accent5"/>
+          </a:effectRef>
+          <a:fontRef idx="minor">
+            <a:schemeClr val="lt1"/>
+          </a:fontRef>
+        </p:style>
+        <p:txBody>
+          <a:bodyPr rtlCol="0" anchor="ctr"/>
+          <a:lstStyle/>
+          <a:p>
+            <a:pPr algn="ctr"/>
+            <a:r>
+              <a:rPr lang="he-IL" dirty="0"/>
+              <a:t>דיאלוג תנאי שימוש</a:t>
+            </a:r>
+            <a:endParaRPr lang="en-US" dirty="0"/>
+          </a:p>
+        </p:txBody>
+      </p:sp>
+      <p:sp>
+        <p:nvSpPr>
+          <p:cNvPr id="30" name="Rectangle: Rounded Corners 29">
+            <a:extLst>
+              <a:ext uri="{FF2B5EF4-FFF2-40B4-BE49-F238E27FC236}">
+                <a16:creationId xmlns:a16="http://schemas.microsoft.com/office/drawing/2014/main" id="{70DDD855-4FFB-4816-8306-4ED78056486C}"/>
+              </a:ext>
+            </a:extLst>
+          </p:cNvPr>
+          <p:cNvSpPr/>
+          <p:nvPr/>
+        </p:nvSpPr>
+        <p:spPr>
+          <a:xfrm>
+            <a:off x="6863244" y="5184792"/>
+            <a:ext cx="844040" cy="403273"/>
+          </a:xfrm>
+          <a:prstGeom prst="roundRect">
+            <a:avLst/>
+          </a:prstGeom>
+          <a:solidFill>
+            <a:schemeClr val="accent1"/>
+          </a:solidFill>
+          <a:ln w="38100">
+            <a:solidFill>
+              <a:schemeClr val="tx1"/>
+            </a:solidFill>
+          </a:ln>
+        </p:spPr>
+        <p:style>
+          <a:lnRef idx="0">
+            <a:schemeClr val="accent5"/>
+          </a:lnRef>
+          <a:fillRef idx="3">
+            <a:schemeClr val="accent5"/>
+          </a:fillRef>
+          <a:effectRef idx="3">
+            <a:schemeClr val="accent5"/>
+          </a:effectRef>
+          <a:fontRef idx="minor">
+            <a:schemeClr val="lt1"/>
+          </a:fontRef>
+        </p:style>
+        <p:txBody>
+          <a:bodyPr rtlCol="0" anchor="ctr"/>
+          <a:lstStyle/>
+          <a:p>
+            <a:pPr algn="ctr"/>
+            <a:r>
+              <a:rPr lang="he-IL" dirty="0"/>
+              <a:t>הירשם</a:t>
+            </a:r>
+            <a:endParaRPr lang="en-US" dirty="0"/>
+          </a:p>
+        </p:txBody>
+      </p:sp>
+      <p:cxnSp>
+        <p:nvCxnSpPr>
+          <p:cNvPr id="28" name="Connector: Elbow 27">
+            <a:extLst>
+              <a:ext uri="{FF2B5EF4-FFF2-40B4-BE49-F238E27FC236}">
+                <a16:creationId xmlns:a16="http://schemas.microsoft.com/office/drawing/2014/main" id="{1F40475B-2659-4936-82A0-40C37EA0CAE3}"/>
+              </a:ext>
+            </a:extLst>
+          </p:cNvPr>
+          <p:cNvCxnSpPr>
+            <a:stCxn id="21" idx="2"/>
+            <a:endCxn id="25" idx="3"/>
+          </p:cNvCxnSpPr>
+          <p:nvPr/>
+        </p:nvCxnSpPr>
+        <p:spPr>
+          <a:xfrm rot="5400000" flipH="1" flipV="1">
+            <a:off x="9132848" y="2818430"/>
+            <a:ext cx="150516" cy="4416502"/>
+          </a:xfrm>
+          <a:prstGeom prst="bentConnector4">
+            <a:avLst>
+              <a:gd name="adj1" fmla="val -545219"/>
+              <a:gd name="adj2" fmla="val 105176"/>
+            </a:avLst>
+          </a:prstGeom>
+          <a:ln w="38100">
+            <a:solidFill>
+              <a:schemeClr val="accent4">
+                <a:lumMod val="50000"/>
+              </a:schemeClr>
+            </a:solidFill>
+            <a:tailEnd type="triangle"/>
+          </a:ln>
+        </p:spPr>
+        <p:style>
+          <a:lnRef idx="1">
+            <a:schemeClr val="accent1"/>
+          </a:lnRef>
+          <a:fillRef idx="0">
+            <a:schemeClr val="accent1"/>
+          </a:fillRef>
+          <a:effectRef idx="0">
+            <a:schemeClr val="accent1"/>
+          </a:effectRef>
+          <a:fontRef idx="minor">
+            <a:schemeClr val="tx1"/>
+          </a:fontRef>
+        </p:style>
+      </p:cxnSp>
     </p:spTree>
     <p:extLst>
       <p:ext uri="{BB962C8B-B14F-4D97-AF65-F5344CB8AC3E}">
@@ -4101,10 +4519,26 @@
           <a:p>
             <a:pPr algn="ctr" rtl="1"/>
             <a:r>
-              <a:rPr lang="he-IL" dirty="0"/>
-              <a:t>מפה</a:t>
-            </a:r>
-            <a:endParaRPr lang="en-US" dirty="0"/>
+              <a:rPr lang="he-IL" b="1" u="sng" dirty="0">
+                <a:effectLst>
+                  <a:outerShdw blurRad="38100" dist="38100" dir="2700000" algn="tl">
+                    <a:srgbClr val="000000">
+                      <a:alpha val="43137"/>
+                    </a:srgbClr>
+                  </a:outerShdw>
+                </a:effectLst>
+              </a:rPr>
+              <a:t>מסך מפה</a:t>
+            </a:r>
+            <a:endParaRPr lang="en-US" b="1" u="sng" dirty="0">
+              <a:effectLst>
+                <a:outerShdw blurRad="38100" dist="38100" dir="2700000" algn="tl">
+                  <a:srgbClr val="000000">
+                    <a:alpha val="43137"/>
+                  </a:srgbClr>
+                </a:outerShdw>
+              </a:effectLst>
+            </a:endParaRPr>
           </a:p>
         </p:txBody>
       </p:sp>
@@ -4426,7 +4860,7 @@
             <p:spPr>
               <a:xfrm>
                 <a:off x="5762636" y="2849732"/>
-                <a:ext cx="1055414" cy="369332"/>
+                <a:ext cx="1055414" cy="646331"/>
               </a:xfrm>
               <a:prstGeom prst="rect">
                 <a:avLst/>
@@ -4441,7 +4875,7 @@
               <a:p>
                 <a:r>
                   <a:rPr lang="he-IL" dirty="0"/>
-                  <a:t>סינונים</a:t>
+                  <a:t> רשימת סינונים</a:t>
                 </a:r>
                 <a:endParaRPr lang="en-US" dirty="0"/>
               </a:p>
@@ -5600,7 +6034,11 @@
               <a:lstStyle/>
               <a:p>
                 <a:pPr algn="ctr"/>
-                <a:endParaRPr lang="en-US"/>
+                <a:endParaRPr lang="en-US" dirty="0">
+                  <a:solidFill>
+                    <a:srgbClr val="FF0000"/>
+                  </a:solidFill>
+                </a:endParaRPr>
               </a:p>
             </p:txBody>
           </p:sp>
@@ -5720,7 +6158,7 @@
               <a:pPr algn="ctr"/>
               <a:r>
                 <a:rPr lang="he-IL" dirty="0"/>
-                <a:t>פתח נקודה </a:t>
+                <a:t>הוסף נקודה </a:t>
               </a:r>
               <a:endParaRPr lang="en-US" dirty="0"/>
             </a:p>
@@ -5766,6 +6204,114 @@
           </a:fontRef>
         </p:style>
       </p:cxnSp>
+      <p:sp>
+        <p:nvSpPr>
+          <p:cNvPr id="4" name="TextBox 3">
+            <a:extLst>
+              <a:ext uri="{FF2B5EF4-FFF2-40B4-BE49-F238E27FC236}">
+                <a16:creationId xmlns:a16="http://schemas.microsoft.com/office/drawing/2014/main" id="{7CD063F4-E239-422C-9C7E-4FF2E4341775}"/>
+              </a:ext>
+            </a:extLst>
+          </p:cNvPr>
+          <p:cNvSpPr txBox="1"/>
+          <p:nvPr/>
+        </p:nvSpPr>
+        <p:spPr>
+          <a:xfrm>
+            <a:off x="9438531" y="63697"/>
+            <a:ext cx="797013" cy="369332"/>
+          </a:xfrm>
+          <a:prstGeom prst="rect">
+            <a:avLst/>
+          </a:prstGeom>
+          <a:noFill/>
+        </p:spPr>
+        <p:txBody>
+          <a:bodyPr wrap="none" rtlCol="0">
+            <a:spAutoFit/>
+          </a:bodyPr>
+          <a:lstStyle/>
+          <a:p>
+            <a:r>
+              <a:rPr lang="he-IL" dirty="0"/>
+              <a:t>מתנדב</a:t>
+            </a:r>
+            <a:endParaRPr lang="en-US" dirty="0"/>
+          </a:p>
+        </p:txBody>
+      </p:sp>
+      <p:sp>
+        <p:nvSpPr>
+          <p:cNvPr id="5" name="TextBox 4">
+            <a:extLst>
+              <a:ext uri="{FF2B5EF4-FFF2-40B4-BE49-F238E27FC236}">
+                <a16:creationId xmlns:a16="http://schemas.microsoft.com/office/drawing/2014/main" id="{ED033A35-1372-4430-B852-5557DA55FA2F}"/>
+              </a:ext>
+            </a:extLst>
+          </p:cNvPr>
+          <p:cNvSpPr txBox="1"/>
+          <p:nvPr/>
+        </p:nvSpPr>
+        <p:spPr>
+          <a:xfrm>
+            <a:off x="11057084" y="3912906"/>
+            <a:ext cx="593432" cy="369332"/>
+          </a:xfrm>
+          <a:prstGeom prst="rect">
+            <a:avLst/>
+          </a:prstGeom>
+          <a:noFill/>
+        </p:spPr>
+        <p:txBody>
+          <a:bodyPr wrap="none" rtlCol="0">
+            <a:spAutoFit/>
+          </a:bodyPr>
+          <a:lstStyle/>
+          <a:p>
+            <a:r>
+              <a:rPr lang="he-IL" dirty="0"/>
+              <a:t>כולם</a:t>
+            </a:r>
+            <a:endParaRPr lang="en-US" dirty="0"/>
+          </a:p>
+        </p:txBody>
+      </p:sp>
+      <p:sp>
+        <p:nvSpPr>
+          <p:cNvPr id="6" name="TextBox 5">
+            <a:extLst>
+              <a:ext uri="{FF2B5EF4-FFF2-40B4-BE49-F238E27FC236}">
+                <a16:creationId xmlns:a16="http://schemas.microsoft.com/office/drawing/2014/main" id="{414DB01A-40EC-47EF-B320-66D3519AA1EF}"/>
+              </a:ext>
+            </a:extLst>
+          </p:cNvPr>
+          <p:cNvSpPr txBox="1"/>
+          <p:nvPr/>
+        </p:nvSpPr>
+        <p:spPr>
+          <a:xfrm>
+            <a:off x="2836905" y="248363"/>
+            <a:ext cx="593432" cy="369332"/>
+          </a:xfrm>
+          <a:prstGeom prst="rect">
+            <a:avLst/>
+          </a:prstGeom>
+          <a:noFill/>
+        </p:spPr>
+        <p:txBody>
+          <a:bodyPr wrap="none" rtlCol="0">
+            <a:spAutoFit/>
+          </a:bodyPr>
+          <a:lstStyle/>
+          <a:p>
+            <a:r>
+              <a:rPr lang="he-IL" dirty="0"/>
+              <a:t>כולם</a:t>
+            </a:r>
+            <a:endParaRPr lang="en-US" dirty="0"/>
+          </a:p>
+        </p:txBody>
+      </p:sp>
     </p:spTree>
     <p:extLst>
       <p:ext uri="{BB962C8B-B14F-4D97-AF65-F5344CB8AC3E}">
@@ -5824,10 +6370,26 @@
           <a:p>
             <a:pPr algn="ctr" rtl="1"/>
             <a:r>
-              <a:rPr lang="he-IL" dirty="0"/>
-              <a:t>הגדרות</a:t>
-            </a:r>
-            <a:endParaRPr lang="en-US" dirty="0"/>
+              <a:rPr lang="he-IL" b="1" u="sng" dirty="0">
+                <a:effectLst>
+                  <a:outerShdw blurRad="38100" dist="38100" dir="2700000" algn="tl">
+                    <a:srgbClr val="000000">
+                      <a:alpha val="43137"/>
+                    </a:srgbClr>
+                  </a:outerShdw>
+                </a:effectLst>
+              </a:rPr>
+              <a:t>מסך הגדרות</a:t>
+            </a:r>
+            <a:endParaRPr lang="en-US" b="1" u="sng" dirty="0">
+              <a:effectLst>
+                <a:outerShdw blurRad="38100" dist="38100" dir="2700000" algn="tl">
+                  <a:srgbClr val="000000">
+                    <a:alpha val="43137"/>
+                  </a:srgbClr>
+                </a:outerShdw>
+              </a:effectLst>
+            </a:endParaRPr>
           </a:p>
         </p:txBody>
       </p:sp>
@@ -5899,8 +6461,8 @@
         </p:nvSpPr>
         <p:spPr>
           <a:xfrm>
-            <a:off x="1428481" y="1416830"/>
-            <a:ext cx="3614036" cy="1754326"/>
+            <a:off x="1428480" y="1416830"/>
+            <a:ext cx="4386393" cy="2585323"/>
           </a:xfrm>
           <a:prstGeom prst="rect">
             <a:avLst/>
@@ -5921,25 +6483,92 @@
             <a:endParaRPr lang="en-US" dirty="0"/>
           </a:p>
           <a:p>
-            <a:pPr algn="r" rtl="1"/>
-            <a:r>
-              <a:rPr lang="he-IL" dirty="0"/>
-              <a:t> - לא יודע עדיין איזה הגדרות</a:t>
-            </a:r>
-          </a:p>
-          <a:p>
-            <a:pPr algn="r" rtl="1"/>
-            <a:r>
-              <a:rPr lang="he-IL" dirty="0"/>
-              <a:t> - דיפולט סינון תוצאות (ע"פ אינפוט יוזר)</a:t>
-            </a:r>
-          </a:p>
-          <a:p>
-            <a:pPr algn="r" rtl="1"/>
-            <a:r>
-              <a:rPr lang="he-IL" dirty="0"/>
-              <a:t> - אפשרות לשדרג יוזר</a:t>
-            </a:r>
+            <a:pPr marL="285750" indent="-285750" algn="r" rtl="1">
+              <a:buFontTx/>
+              <a:buChar char="-"/>
+            </a:pPr>
+            <a:r>
+              <a:rPr lang="he-IL" dirty="0" err="1"/>
+              <a:t>דיפולט</a:t>
+            </a:r>
+            <a:r>
+              <a:rPr lang="he-IL" dirty="0"/>
+              <a:t> סינון תוצאות (ע"פ אינפוט </a:t>
+            </a:r>
+            <a:r>
+              <a:rPr lang="he-IL" dirty="0" err="1"/>
+              <a:t>יוזר</a:t>
+            </a:r>
+            <a:r>
+              <a:rPr lang="he-IL" dirty="0"/>
+              <a:t>)</a:t>
+            </a:r>
+          </a:p>
+          <a:p>
+            <a:pPr marL="285750" indent="-285750" algn="r" rtl="1">
+              <a:buFontTx/>
+              <a:buChar char="-"/>
+            </a:pPr>
+            <a:r>
+              <a:rPr lang="he-IL" dirty="0"/>
+              <a:t>כיבוי / הדלקה של התראות</a:t>
+            </a:r>
+            <a:endParaRPr lang="en-US" dirty="0"/>
+          </a:p>
+          <a:p>
+            <a:pPr marL="285750" indent="-285750" algn="r" rtl="1">
+              <a:buFontTx/>
+              <a:buChar char="-"/>
+            </a:pPr>
+            <a:r>
+              <a:rPr lang="he-IL" dirty="0"/>
+              <a:t>אפשרות להפוך למתנדב</a:t>
+            </a:r>
+            <a:r>
+              <a:rPr lang="en-US" dirty="0"/>
+              <a:t> </a:t>
+            </a:r>
+            <a:r>
+              <a:rPr lang="he-IL" dirty="0"/>
+              <a:t> - דרך סודית</a:t>
+            </a:r>
+          </a:p>
+          <a:p>
+            <a:pPr marL="285750" indent="-285750" algn="r" rtl="1">
+              <a:buFontTx/>
+              <a:buChar char="-"/>
+            </a:pPr>
+            <a:r>
+              <a:rPr lang="he-IL" dirty="0"/>
+              <a:t>מחק </a:t>
+            </a:r>
+            <a:r>
+              <a:rPr lang="en-US" dirty="0"/>
+              <a:t>Locations</a:t>
+            </a:r>
+            <a:endParaRPr lang="he-IL" dirty="0"/>
+          </a:p>
+          <a:p>
+            <a:pPr marL="285750" indent="-285750" algn="r" rtl="1">
+              <a:buFontTx/>
+              <a:buChar char="-"/>
+            </a:pPr>
+            <a:r>
+              <a:rPr lang="en-US" dirty="0"/>
+              <a:t>Dark mode / Light mode</a:t>
+            </a:r>
+            <a:r>
+              <a:rPr lang="he-IL" dirty="0"/>
+              <a:t> – בדיקה – לא בטוח</a:t>
+            </a:r>
+            <a:endParaRPr lang="en-US" dirty="0"/>
+          </a:p>
+          <a:p>
+            <a:pPr marL="285750" indent="-285750" algn="r" rtl="1">
+              <a:buFontTx/>
+              <a:buChar char="-"/>
+            </a:pPr>
+            <a:endParaRPr lang="he-IL" dirty="0"/>
           </a:p>
           <a:p>
             <a:pPr algn="r" rtl="1"/>
@@ -6077,7 +6706,7 @@
           <a:p>
             <a:r>
               <a:rPr lang="he-IL" dirty="0"/>
-              <a:t>כלמיני הגדרות</a:t>
+              <a:t>כל מיני הגדרות</a:t>
             </a:r>
             <a:endParaRPr lang="en-US" dirty="0"/>
           </a:p>
@@ -6316,6 +6945,228 @@
           </p:spPr>
         </p:pic>
       </p:grpSp>
+      <p:sp>
+        <p:nvSpPr>
+          <p:cNvPr id="6" name="Freeform: Shape 5">
+            <a:extLst>
+              <a:ext uri="{FF2B5EF4-FFF2-40B4-BE49-F238E27FC236}">
+                <a16:creationId xmlns:a16="http://schemas.microsoft.com/office/drawing/2014/main" id="{0EFA07AF-A982-4572-86F5-B72491FC9E11}"/>
+              </a:ext>
+            </a:extLst>
+          </p:cNvPr>
+          <p:cNvSpPr/>
+          <p:nvPr/>
+        </p:nvSpPr>
+        <p:spPr>
+          <a:xfrm>
+            <a:off x="5788241" y="2405849"/>
+            <a:ext cx="179936" cy="302971"/>
+          </a:xfrm>
+          <a:custGeom>
+            <a:avLst/>
+            <a:gdLst>
+              <a:gd name="connsiteX0" fmla="*/ 0 w 179936"/>
+              <a:gd name="connsiteY0" fmla="*/ 0 h 302971"/>
+              <a:gd name="connsiteX1" fmla="*/ 177553 w 179936"/>
+              <a:gd name="connsiteY1" fmla="*/ 17755 h 302971"/>
+              <a:gd name="connsiteX2" fmla="*/ 159798 w 179936"/>
+              <a:gd name="connsiteY2" fmla="*/ 44388 h 302971"/>
+              <a:gd name="connsiteX3" fmla="*/ 133165 w 179936"/>
+              <a:gd name="connsiteY3" fmla="*/ 195308 h 302971"/>
+              <a:gd name="connsiteX4" fmla="*/ 142042 w 179936"/>
+              <a:gd name="connsiteY4" fmla="*/ 266330 h 302971"/>
+              <a:gd name="connsiteX5" fmla="*/ 133165 w 179936"/>
+              <a:gd name="connsiteY5" fmla="*/ 292963 h 302971"/>
+              <a:gd name="connsiteX6" fmla="*/ 0 w 179936"/>
+              <a:gd name="connsiteY6" fmla="*/ 301840 h 302971"/>
+            </a:gdLst>
+            <a:ahLst/>
+            <a:cxnLst>
+              <a:cxn ang="0">
+                <a:pos x="connsiteX0" y="connsiteY0"/>
+              </a:cxn>
+              <a:cxn ang="0">
+                <a:pos x="connsiteX1" y="connsiteY1"/>
+              </a:cxn>
+              <a:cxn ang="0">
+                <a:pos x="connsiteX2" y="connsiteY2"/>
+              </a:cxn>
+              <a:cxn ang="0">
+                <a:pos x="connsiteX3" y="connsiteY3"/>
+              </a:cxn>
+              <a:cxn ang="0">
+                <a:pos x="connsiteX4" y="connsiteY4"/>
+              </a:cxn>
+              <a:cxn ang="0">
+                <a:pos x="connsiteX5" y="connsiteY5"/>
+              </a:cxn>
+              <a:cxn ang="0">
+                <a:pos x="connsiteX6" y="connsiteY6"/>
+              </a:cxn>
+            </a:cxnLst>
+            <a:rect l="l" t="t" r="r" b="b"/>
+            <a:pathLst>
+              <a:path w="179936" h="302971">
+                <a:moveTo>
+                  <a:pt x="0" y="0"/>
+                </a:moveTo>
+                <a:cubicBezTo>
+                  <a:pt x="59184" y="5918"/>
+                  <a:pt x="120243" y="1836"/>
+                  <a:pt x="177553" y="17755"/>
+                </a:cubicBezTo>
+                <a:cubicBezTo>
+                  <a:pt x="187833" y="20611"/>
+                  <a:pt x="161652" y="33881"/>
+                  <a:pt x="159798" y="44388"/>
+                </a:cubicBezTo>
+                <a:cubicBezTo>
+                  <a:pt x="130884" y="208231"/>
+                  <a:pt x="178910" y="126689"/>
+                  <a:pt x="133165" y="195308"/>
+                </a:cubicBezTo>
+                <a:cubicBezTo>
+                  <a:pt x="136124" y="218982"/>
+                  <a:pt x="142042" y="242472"/>
+                  <a:pt x="142042" y="266330"/>
+                </a:cubicBezTo>
+                <a:cubicBezTo>
+                  <a:pt x="142042" y="275688"/>
+                  <a:pt x="140951" y="287772"/>
+                  <a:pt x="133165" y="292963"/>
+                </a:cubicBezTo>
+                <a:cubicBezTo>
+                  <a:pt x="111145" y="307643"/>
+                  <a:pt x="3091" y="301840"/>
+                  <a:pt x="0" y="301840"/>
+                </a:cubicBezTo>
+              </a:path>
+            </a:pathLst>
+          </a:custGeom>
+          <a:noFill/>
+          <a:ln w="38100">
+            <a:solidFill>
+              <a:schemeClr val="accent2"/>
+            </a:solidFill>
+          </a:ln>
+        </p:spPr>
+        <p:style>
+          <a:lnRef idx="2">
+            <a:schemeClr val="accent1">
+              <a:shade val="50000"/>
+            </a:schemeClr>
+          </a:lnRef>
+          <a:fillRef idx="1">
+            <a:schemeClr val="accent1"/>
+          </a:fillRef>
+          <a:effectRef idx="0">
+            <a:schemeClr val="accent1"/>
+          </a:effectRef>
+          <a:fontRef idx="minor">
+            <a:schemeClr val="lt1"/>
+          </a:fontRef>
+        </p:style>
+        <p:txBody>
+          <a:bodyPr rtlCol="0" anchor="ctr"/>
+          <a:lstStyle/>
+          <a:p>
+            <a:pPr algn="ctr"/>
+            <a:endParaRPr lang="en-US"/>
+          </a:p>
+        </p:txBody>
+      </p:sp>
+      <p:sp>
+        <p:nvSpPr>
+          <p:cNvPr id="9" name="TextBox 8">
+            <a:extLst>
+              <a:ext uri="{FF2B5EF4-FFF2-40B4-BE49-F238E27FC236}">
+                <a16:creationId xmlns:a16="http://schemas.microsoft.com/office/drawing/2014/main" id="{C1E897F9-69F1-4007-81EF-D98858F1914F}"/>
+              </a:ext>
+            </a:extLst>
+          </p:cNvPr>
+          <p:cNvSpPr txBox="1"/>
+          <p:nvPr/>
+        </p:nvSpPr>
+        <p:spPr>
+          <a:xfrm>
+            <a:off x="4224255" y="5684525"/>
+            <a:ext cx="2141933" cy="369332"/>
+          </a:xfrm>
+          <a:prstGeom prst="rect">
+            <a:avLst/>
+          </a:prstGeom>
+          <a:noFill/>
+          <a:ln w="38100">
+            <a:solidFill>
+              <a:schemeClr val="accent2"/>
+            </a:solidFill>
+          </a:ln>
+        </p:spPr>
+        <p:txBody>
+          <a:bodyPr wrap="none" rtlCol="0">
+            <a:spAutoFit/>
+          </a:bodyPr>
+          <a:lstStyle/>
+          <a:p>
+            <a:r>
+              <a:rPr lang="he-IL" dirty="0"/>
+              <a:t>בעבור מתנדבים בלבד</a:t>
+            </a:r>
+            <a:endParaRPr lang="en-US" dirty="0"/>
+          </a:p>
+        </p:txBody>
+      </p:sp>
+      <p:cxnSp>
+        <p:nvCxnSpPr>
+          <p:cNvPr id="17" name="Connector: Elbow 16">
+            <a:extLst>
+              <a:ext uri="{FF2B5EF4-FFF2-40B4-BE49-F238E27FC236}">
+                <a16:creationId xmlns:a16="http://schemas.microsoft.com/office/drawing/2014/main" id="{65AA5C4A-F078-4D50-BFA4-7838A6EC0FAD}"/>
+              </a:ext>
+            </a:extLst>
+          </p:cNvPr>
+          <p:cNvCxnSpPr>
+            <a:stCxn id="6" idx="3"/>
+            <a:endCxn id="9" idx="0"/>
+          </p:cNvCxnSpPr>
+          <p:nvPr/>
+        </p:nvCxnSpPr>
+        <p:spPr>
+          <a:xfrm flipH="1">
+            <a:off x="5295222" y="2601157"/>
+            <a:ext cx="626184" cy="3083368"/>
+          </a:xfrm>
+          <a:prstGeom prst="bentConnector4">
+            <a:avLst>
+              <a:gd name="adj1" fmla="val -36507"/>
+              <a:gd name="adj2" fmla="val 51746"/>
+            </a:avLst>
+          </a:prstGeom>
+          <a:ln w="38100">
+            <a:solidFill>
+              <a:schemeClr val="accent6">
+                <a:lumMod val="75000"/>
+              </a:schemeClr>
+            </a:solidFill>
+            <a:headEnd type="triangle"/>
+            <a:tailEnd type="triangle"/>
+          </a:ln>
+        </p:spPr>
+        <p:style>
+          <a:lnRef idx="1">
+            <a:schemeClr val="accent1"/>
+          </a:lnRef>
+          <a:fillRef idx="0">
+            <a:schemeClr val="accent1"/>
+          </a:fillRef>
+          <a:effectRef idx="0">
+            <a:schemeClr val="accent1"/>
+          </a:effectRef>
+          <a:fontRef idx="minor">
+            <a:schemeClr val="tx1"/>
+          </a:fontRef>
+        </p:style>
+      </p:cxnSp>
     </p:spTree>
     <p:extLst>
       <p:ext uri="{BB962C8B-B14F-4D97-AF65-F5344CB8AC3E}">
@@ -6374,10 +7225,26 @@
           <a:p>
             <a:pPr algn="ctr" rtl="1"/>
             <a:r>
-              <a:rPr lang="he-IL" dirty="0"/>
-              <a:t>חיפוש</a:t>
-            </a:r>
-            <a:endParaRPr lang="en-US" dirty="0"/>
+              <a:rPr lang="he-IL" b="1" u="sng" dirty="0">
+                <a:effectLst>
+                  <a:outerShdw blurRad="38100" dist="38100" dir="2700000" algn="tl">
+                    <a:srgbClr val="000000">
+                      <a:alpha val="43137"/>
+                    </a:srgbClr>
+                  </a:outerShdw>
+                </a:effectLst>
+              </a:rPr>
+              <a:t>מסך חיפוש</a:t>
+            </a:r>
+            <a:endParaRPr lang="en-US" b="1" u="sng" dirty="0">
+              <a:effectLst>
+                <a:outerShdw blurRad="38100" dist="38100" dir="2700000" algn="tl">
+                  <a:srgbClr val="000000">
+                    <a:alpha val="43137"/>
+                  </a:srgbClr>
+                </a:outerShdw>
+              </a:effectLst>
+            </a:endParaRPr>
           </a:p>
         </p:txBody>
       </p:sp>
@@ -6395,7 +7262,7 @@
         </p:nvSpPr>
         <p:spPr>
           <a:xfrm>
-            <a:off x="8152886" y="1269507"/>
+            <a:off x="7087566" y="1189579"/>
             <a:ext cx="2790334" cy="4926928"/>
           </a:xfrm>
           <a:prstGeom prst="rect">
@@ -6493,7 +7360,7 @@
         </p:nvSpPr>
         <p:spPr>
           <a:xfrm>
-            <a:off x="8152886" y="1269507"/>
+            <a:off x="7087566" y="1189579"/>
             <a:ext cx="2790334" cy="541538"/>
           </a:xfrm>
           <a:prstGeom prst="rect">
@@ -6549,7 +7416,7 @@
         </p:nvSpPr>
         <p:spPr>
           <a:xfrm>
-            <a:off x="9111086" y="1351171"/>
+            <a:off x="8045766" y="1271243"/>
             <a:ext cx="1358283" cy="369332"/>
           </a:xfrm>
           <a:prstGeom prst="rect">
@@ -6593,7 +7460,7 @@
         </p:nvSpPr>
         <p:spPr>
           <a:xfrm>
-            <a:off x="8152886" y="3582009"/>
+            <a:off x="7087566" y="3502081"/>
             <a:ext cx="2790334" cy="646331"/>
           </a:xfrm>
           <a:prstGeom prst="rect">
@@ -6646,7 +7513,7 @@
         </p:nvSpPr>
         <p:spPr>
           <a:xfrm>
-            <a:off x="8152886" y="1811045"/>
+            <a:off x="7087566" y="1731117"/>
             <a:ext cx="2790334" cy="1754326"/>
           </a:xfrm>
           <a:prstGeom prst="rect">
@@ -6668,10 +7535,15 @@
             <a:pPr algn="ctr"/>
             <a:r>
               <a:rPr lang="he-IL" dirty="0"/>
-              <a:t>שדות סינון</a:t>
-            </a:r>
-          </a:p>
-          <a:p>
+              <a:t>שדות סינון מתוך אובייקט </a:t>
+            </a:r>
+            <a:br>
+              <a:rPr lang="en-US" dirty="0"/>
+            </a:br>
+            <a:r>
+              <a:rPr lang="en-US" dirty="0"/>
+              <a:t>Location</a:t>
+            </a:r>
             <a:endParaRPr lang="he-IL" dirty="0"/>
           </a:p>
           <a:p>
@@ -6702,7 +7574,7 @@
         </p:nvSpPr>
         <p:spPr>
           <a:xfrm>
-            <a:off x="8152886" y="4884655"/>
+            <a:off x="7087566" y="4804727"/>
             <a:ext cx="2790334" cy="646331"/>
           </a:xfrm>
           <a:prstGeom prst="rect">
@@ -6755,7 +7627,7 @@
         </p:nvSpPr>
         <p:spPr>
           <a:xfrm>
-            <a:off x="8152886" y="4226612"/>
+            <a:off x="7087566" y="4146684"/>
             <a:ext cx="2790334" cy="646331"/>
           </a:xfrm>
           <a:prstGeom prst="rect">
@@ -6808,7 +7680,7 @@
         </p:nvGrpSpPr>
         <p:grpSpPr>
           <a:xfrm>
-            <a:off x="5111205" y="2624956"/>
+            <a:off x="1819635" y="2718301"/>
             <a:ext cx="2325949" cy="3071693"/>
             <a:chOff x="5042517" y="2087161"/>
             <a:chExt cx="2325949" cy="3071693"/>
@@ -7024,8 +7896,8 @@
         </p:nvCxnSpPr>
         <p:spPr>
           <a:xfrm flipH="1">
-            <a:off x="7437154" y="3905175"/>
-            <a:ext cx="715732" cy="255628"/>
+            <a:off x="4145584" y="3825247"/>
+            <a:ext cx="2941982" cy="428901"/>
           </a:xfrm>
           <a:prstGeom prst="line">
             <a:avLst/>
@@ -7060,7 +7932,7 @@
         </p:nvSpPr>
         <p:spPr>
           <a:xfrm>
-            <a:off x="9131344" y="3187815"/>
+            <a:off x="8066024" y="3107887"/>
             <a:ext cx="906011" cy="283577"/>
           </a:xfrm>
           <a:prstGeom prst="rect">
@@ -7120,7 +7992,7 @@
         </p:nvSpPr>
         <p:spPr>
           <a:xfrm>
-            <a:off x="8152886" y="5639389"/>
+            <a:off x="7087566" y="5559461"/>
             <a:ext cx="2790334" cy="541538"/>
           </a:xfrm>
           <a:prstGeom prst="rect">
@@ -7193,7 +8065,7 @@
         </p:blipFill>
         <p:spPr>
           <a:xfrm>
-            <a:off x="10268755" y="5652377"/>
+            <a:off x="9203435" y="5572449"/>
             <a:ext cx="535297" cy="535297"/>
           </a:xfrm>
           <a:prstGeom prst="rect">
@@ -7232,7 +8104,7 @@
         </p:blipFill>
         <p:spPr>
           <a:xfrm>
-            <a:off x="9584350" y="5647635"/>
+            <a:off x="8519030" y="5567707"/>
             <a:ext cx="593574" cy="593574"/>
           </a:xfrm>
           <a:prstGeom prst="rect">
@@ -7271,7 +8143,7 @@
         </p:blipFill>
         <p:spPr>
           <a:xfrm>
-            <a:off x="8888050" y="5657747"/>
+            <a:off x="7822730" y="5577819"/>
             <a:ext cx="461462" cy="461462"/>
           </a:xfrm>
           <a:prstGeom prst="rect">
@@ -7310,7 +8182,7 @@
         </p:blipFill>
         <p:spPr>
           <a:xfrm>
-            <a:off x="8288802" y="5680118"/>
+            <a:off x="7223482" y="5600190"/>
             <a:ext cx="460080" cy="460080"/>
           </a:xfrm>
           <a:prstGeom prst="rect">
@@ -7353,7 +8225,7 @@
           <p:cNvPr id="2" name="Title 1">
             <a:extLst>
               <a:ext uri="{FF2B5EF4-FFF2-40B4-BE49-F238E27FC236}">
-                <a16:creationId xmlns:a16="http://schemas.microsoft.com/office/drawing/2014/main" id="{43551F67-0887-4CF3-A558-3259299FB54E}"/>
+                <a16:creationId xmlns:a16="http://schemas.microsoft.com/office/drawing/2014/main" id="{DEE5D181-BEFB-4CD6-90F3-CF7C2099E13B}"/>
               </a:ext>
             </a:extLst>
           </p:cNvPr>
@@ -7364,6 +8236,774 @@
             <p:ph type="title"/>
           </p:nvPr>
         </p:nvSpPr>
+        <p:spPr/>
+        <p:txBody>
+          <a:bodyPr/>
+          <a:lstStyle/>
+          <a:p>
+            <a:pPr algn="r" rtl="1"/>
+            <a:r>
+              <a:rPr lang="he-IL" dirty="0"/>
+              <a:t>אובייקט </a:t>
+            </a:r>
+            <a:r>
+              <a:rPr lang="en-US" dirty="0"/>
+              <a:t>Location</a:t>
+            </a:r>
+          </a:p>
+        </p:txBody>
+      </p:sp>
+      <p:graphicFrame>
+        <p:nvGraphicFramePr>
+          <p:cNvPr id="5" name="Table 5">
+            <a:extLst>
+              <a:ext uri="{FF2B5EF4-FFF2-40B4-BE49-F238E27FC236}">
+                <a16:creationId xmlns:a16="http://schemas.microsoft.com/office/drawing/2014/main" id="{B49D1DAE-86A5-4480-BB25-DE6191F83744}"/>
+              </a:ext>
+            </a:extLst>
+          </p:cNvPr>
+          <p:cNvGraphicFramePr>
+            <a:graphicFrameLocks noGrp="1"/>
+          </p:cNvGraphicFramePr>
+          <p:nvPr>
+            <p:extLst>
+              <p:ext uri="{D42A27DB-BD31-4B8C-83A1-F6EECF244321}">
+                <p14:modId xmlns:p14="http://schemas.microsoft.com/office/powerpoint/2010/main" val="4024090490"/>
+              </p:ext>
+            </p:extLst>
+          </p:nvPr>
+        </p:nvGraphicFramePr>
+        <p:xfrm>
+          <a:off x="2032000" y="2010285"/>
+          <a:ext cx="8128000" cy="3337560"/>
+        </p:xfrm>
+        <a:graphic>
+          <a:graphicData uri="http://schemas.openxmlformats.org/drawingml/2006/table">
+            <a:tbl>
+              <a:tblPr firstRow="1" bandRow="1">
+                <a:tableStyleId>{5C22544A-7EE6-4342-B048-85BDC9FD1C3A}</a:tableStyleId>
+              </a:tblPr>
+              <a:tblGrid>
+                <a:gridCol w="4064000">
+                  <a:extLst>
+                    <a:ext uri="{9D8B030D-6E8A-4147-A177-3AD203B41FA5}">
+                      <a16:colId xmlns:a16="http://schemas.microsoft.com/office/drawing/2014/main" val="3402053836"/>
+                    </a:ext>
+                  </a:extLst>
+                </a:gridCol>
+                <a:gridCol w="4064000">
+                  <a:extLst>
+                    <a:ext uri="{9D8B030D-6E8A-4147-A177-3AD203B41FA5}">
+                      <a16:colId xmlns:a16="http://schemas.microsoft.com/office/drawing/2014/main" val="162965318"/>
+                    </a:ext>
+                  </a:extLst>
+                </a:gridCol>
+              </a:tblGrid>
+              <a:tr h="370840">
+                <a:tc>
+                  <a:txBody>
+                    <a:bodyPr/>
+                    <a:lstStyle/>
+                    <a:p>
+                      <a:pPr algn="ctr" rtl="1"/>
+                      <a:r>
+                        <a:rPr lang="he-IL" dirty="0"/>
+                        <a:t>סוג</a:t>
+                      </a:r>
+                      <a:endParaRPr lang="en-US" dirty="0"/>
+                    </a:p>
+                  </a:txBody>
+                  <a:tcPr/>
+                </a:tc>
+                <a:tc>
+                  <a:txBody>
+                    <a:bodyPr/>
+                    <a:lstStyle/>
+                    <a:p>
+                      <a:pPr algn="ctr" rtl="1"/>
+                      <a:r>
+                        <a:rPr lang="he-IL" dirty="0"/>
+                        <a:t>שם</a:t>
+                      </a:r>
+                      <a:endParaRPr lang="en-US" dirty="0"/>
+                    </a:p>
+                  </a:txBody>
+                  <a:tcPr/>
+                </a:tc>
+                <a:extLst>
+                  <a:ext uri="{0D108BD9-81ED-4DB2-BD59-A6C34878D82A}">
+                    <a16:rowId xmlns:a16="http://schemas.microsoft.com/office/drawing/2014/main" val="1174045861"/>
+                  </a:ext>
+                </a:extLst>
+              </a:tr>
+              <a:tr h="370840">
+                <a:tc>
+                  <a:txBody>
+                    <a:bodyPr/>
+                    <a:lstStyle/>
+                    <a:p>
+                      <a:pPr algn="ctr" rtl="1"/>
+                      <a:r>
+                        <a:rPr lang="en-US" sz="1800" kern="1200" dirty="0">
+                          <a:solidFill>
+                            <a:schemeClr val="dk1"/>
+                          </a:solidFill>
+                          <a:effectLst/>
+                          <a:latin typeface="+mn-lt"/>
+                          <a:ea typeface="+mn-ea"/>
+                          <a:cs typeface="+mn-cs"/>
+                        </a:rPr>
+                        <a:t>Longitude</a:t>
+                      </a:r>
+                      <a:r>
+                        <a:rPr lang="en-US" dirty="0"/>
+                        <a:t> </a:t>
+                      </a:r>
+                      <a:r>
+                        <a:rPr lang="en-US" dirty="0">
+                          <a:sym typeface="Wingdings" panose="05000000000000000000" pitchFamily="2" charset="2"/>
+                        </a:rPr>
+                        <a:t></a:t>
+                      </a:r>
+                      <a:r>
+                        <a:rPr lang="en-US" dirty="0"/>
+                        <a:t> double</a:t>
+                      </a:r>
+                    </a:p>
+                  </a:txBody>
+                  <a:tcPr/>
+                </a:tc>
+                <a:tc rowSpan="2">
+                  <a:txBody>
+                    <a:bodyPr/>
+                    <a:lstStyle/>
+                    <a:p>
+                      <a:pPr algn="ctr" rtl="1"/>
+                      <a:r>
+                        <a:rPr lang="he-IL" dirty="0"/>
+                        <a:t>מיקום</a:t>
+                      </a:r>
+                      <a:r>
+                        <a:rPr lang="he-IL" dirty="0">
+                          <a:solidFill>
+                            <a:schemeClr val="accent1">
+                              <a:lumMod val="75000"/>
+                            </a:schemeClr>
+                          </a:solidFill>
+                          <a:sym typeface="Wingdings" panose="05000000000000000000" pitchFamily="2" charset="2"/>
+                        </a:rPr>
+                        <a:t></a:t>
+                      </a:r>
+                      <a:endParaRPr lang="en-US" dirty="0"/>
+                    </a:p>
+                  </a:txBody>
+                  <a:tcPr anchor="ctr"/>
+                </a:tc>
+                <a:extLst>
+                  <a:ext uri="{0D108BD9-81ED-4DB2-BD59-A6C34878D82A}">
+                    <a16:rowId xmlns:a16="http://schemas.microsoft.com/office/drawing/2014/main" val="1107968380"/>
+                  </a:ext>
+                </a:extLst>
+              </a:tr>
+              <a:tr h="370840">
+                <a:tc>
+                  <a:txBody>
+                    <a:bodyPr/>
+                    <a:lstStyle/>
+                    <a:p>
+                      <a:pPr algn="ctr" rtl="1"/>
+                      <a:r>
+                        <a:rPr lang="en-US" sz="1800" kern="1200" dirty="0">
+                          <a:solidFill>
+                            <a:schemeClr val="dk1"/>
+                          </a:solidFill>
+                          <a:effectLst/>
+                          <a:latin typeface="+mn-lt"/>
+                          <a:ea typeface="+mn-ea"/>
+                          <a:cs typeface="+mn-cs"/>
+                        </a:rPr>
+                        <a:t>Latitude </a:t>
+                      </a:r>
+                      <a:r>
+                        <a:rPr lang="en-US" sz="1800" kern="1200" dirty="0">
+                          <a:solidFill>
+                            <a:schemeClr val="dk1"/>
+                          </a:solidFill>
+                          <a:effectLst/>
+                          <a:latin typeface="+mn-lt"/>
+                          <a:ea typeface="+mn-ea"/>
+                          <a:cs typeface="+mn-cs"/>
+                          <a:sym typeface="Wingdings" panose="05000000000000000000" pitchFamily="2" charset="2"/>
+                        </a:rPr>
+                        <a:t></a:t>
+                      </a:r>
+                      <a:r>
+                        <a:rPr lang="en-US" sz="1800" kern="1200" dirty="0">
+                          <a:solidFill>
+                            <a:schemeClr val="dk1"/>
+                          </a:solidFill>
+                          <a:effectLst/>
+                          <a:latin typeface="+mn-lt"/>
+                          <a:ea typeface="+mn-ea"/>
+                          <a:cs typeface="+mn-cs"/>
+                        </a:rPr>
+                        <a:t> double</a:t>
+                      </a:r>
+                      <a:endParaRPr lang="en-US" dirty="0"/>
+                    </a:p>
+                  </a:txBody>
+                  <a:tcPr/>
+                </a:tc>
+                <a:tc vMerge="1">
+                  <a:txBody>
+                    <a:bodyPr/>
+                    <a:lstStyle/>
+                    <a:p>
+                      <a:pPr algn="ctr" rtl="1"/>
+                      <a:endParaRPr lang="en-US" dirty="0"/>
+                    </a:p>
+                  </a:txBody>
+                  <a:tcPr/>
+                </a:tc>
+                <a:extLst>
+                  <a:ext uri="{0D108BD9-81ED-4DB2-BD59-A6C34878D82A}">
+                    <a16:rowId xmlns:a16="http://schemas.microsoft.com/office/drawing/2014/main" val="2619461342"/>
+                  </a:ext>
+                </a:extLst>
+              </a:tr>
+              <a:tr h="370840">
+                <a:tc rowSpan="2">
+                  <a:txBody>
+                    <a:bodyPr/>
+                    <a:lstStyle/>
+                    <a:p>
+                      <a:pPr algn="ctr" rtl="1"/>
+                      <a:r>
+                        <a:rPr lang="en-US" dirty="0"/>
+                        <a:t>String </a:t>
+                      </a:r>
+                      <a:r>
+                        <a:rPr lang="en-US" dirty="0">
+                          <a:sym typeface="Wingdings" panose="05000000000000000000" pitchFamily="2" charset="2"/>
+                        </a:rPr>
+                        <a:t> “</a:t>
+                      </a:r>
+                      <a:r>
+                        <a:rPr lang="en-US" dirty="0" err="1">
+                          <a:sym typeface="Wingdings" panose="05000000000000000000" pitchFamily="2" charset="2"/>
+                        </a:rPr>
+                        <a:t>yyyy</a:t>
+                      </a:r>
+                      <a:r>
+                        <a:rPr lang="en-US" dirty="0">
+                          <a:sym typeface="Wingdings" panose="05000000000000000000" pitchFamily="2" charset="2"/>
+                        </a:rPr>
+                        <a:t>-mm-dd </a:t>
+                      </a:r>
+                      <a:r>
+                        <a:rPr lang="en-US" dirty="0" err="1">
+                          <a:sym typeface="Wingdings" panose="05000000000000000000" pitchFamily="2" charset="2"/>
+                        </a:rPr>
+                        <a:t>hh:mm:ss</a:t>
+                      </a:r>
+                      <a:r>
+                        <a:rPr lang="en-US" dirty="0">
+                          <a:sym typeface="Wingdings" panose="05000000000000000000" pitchFamily="2" charset="2"/>
+                        </a:rPr>
+                        <a:t>”</a:t>
+                      </a:r>
+                      <a:endParaRPr lang="en-US" dirty="0"/>
+                    </a:p>
+                  </a:txBody>
+                  <a:tcPr anchor="ctr"/>
+                </a:tc>
+                <a:tc>
+                  <a:txBody>
+                    <a:bodyPr/>
+                    <a:lstStyle/>
+                    <a:p>
+                      <a:pPr algn="ctr" rtl="1"/>
+                      <a:r>
+                        <a:rPr lang="he-IL" dirty="0"/>
+                        <a:t>זמן פתיחה</a:t>
+                      </a:r>
+                      <a:r>
+                        <a:rPr lang="he-IL" dirty="0">
+                          <a:solidFill>
+                            <a:srgbClr val="FF0000"/>
+                          </a:solidFill>
+                          <a:sym typeface="Wingdings" panose="05000000000000000000" pitchFamily="2" charset="2"/>
+                        </a:rPr>
+                        <a:t></a:t>
+                      </a:r>
+                      <a:endParaRPr lang="en-US" dirty="0"/>
+                    </a:p>
+                  </a:txBody>
+                  <a:tcPr/>
+                </a:tc>
+                <a:extLst>
+                  <a:ext uri="{0D108BD9-81ED-4DB2-BD59-A6C34878D82A}">
+                    <a16:rowId xmlns:a16="http://schemas.microsoft.com/office/drawing/2014/main" val="4280208059"/>
+                  </a:ext>
+                </a:extLst>
+              </a:tr>
+              <a:tr h="370840">
+                <a:tc vMerge="1">
+                  <a:txBody>
+                    <a:bodyPr/>
+                    <a:lstStyle/>
+                    <a:p>
+                      <a:pPr algn="ctr" rtl="1"/>
+                      <a:endParaRPr lang="en-US" dirty="0"/>
+                    </a:p>
+                  </a:txBody>
+                  <a:tcPr/>
+                </a:tc>
+                <a:tc>
+                  <a:txBody>
+                    <a:bodyPr/>
+                    <a:lstStyle/>
+                    <a:p>
+                      <a:pPr algn="ctr" rtl="1"/>
+                      <a:r>
+                        <a:rPr lang="he-IL" dirty="0"/>
+                        <a:t>זמן סגירה</a:t>
+                      </a:r>
+                      <a:r>
+                        <a:rPr lang="he-IL" dirty="0">
+                          <a:solidFill>
+                            <a:srgbClr val="FF0000"/>
+                          </a:solidFill>
+                          <a:sym typeface="Wingdings" panose="05000000000000000000" pitchFamily="2" charset="2"/>
+                        </a:rPr>
+                        <a:t></a:t>
+                      </a:r>
+                      <a:endParaRPr lang="en-US" dirty="0"/>
+                    </a:p>
+                  </a:txBody>
+                  <a:tcPr/>
+                </a:tc>
+                <a:extLst>
+                  <a:ext uri="{0D108BD9-81ED-4DB2-BD59-A6C34878D82A}">
+                    <a16:rowId xmlns:a16="http://schemas.microsoft.com/office/drawing/2014/main" val="693474728"/>
+                  </a:ext>
+                </a:extLst>
+              </a:tr>
+              <a:tr h="370840">
+                <a:tc>
+                  <a:txBody>
+                    <a:bodyPr/>
+                    <a:lstStyle/>
+                    <a:p>
+                      <a:pPr algn="ctr" rtl="1"/>
+                      <a:r>
+                        <a:rPr lang="en-US" dirty="0"/>
+                        <a:t>Int</a:t>
+                      </a:r>
+                    </a:p>
+                  </a:txBody>
+                  <a:tcPr/>
+                </a:tc>
+                <a:tc>
+                  <a:txBody>
+                    <a:bodyPr/>
+                    <a:lstStyle/>
+                    <a:p>
+                      <a:pPr algn="ctr" rtl="1"/>
+                      <a:r>
+                        <a:rPr lang="he-IL" dirty="0"/>
+                        <a:t>רדיוס מיקום (מטרים)</a:t>
+                      </a:r>
+                      <a:r>
+                        <a:rPr lang="he-IL" dirty="0">
+                          <a:solidFill>
+                            <a:schemeClr val="accent1">
+                              <a:lumMod val="75000"/>
+                            </a:schemeClr>
+                          </a:solidFill>
+                          <a:sym typeface="Wingdings" panose="05000000000000000000" pitchFamily="2" charset="2"/>
+                        </a:rPr>
+                        <a:t></a:t>
+                      </a:r>
+                      <a:endParaRPr lang="en-US" dirty="0"/>
+                    </a:p>
+                  </a:txBody>
+                  <a:tcPr/>
+                </a:tc>
+                <a:extLst>
+                  <a:ext uri="{0D108BD9-81ED-4DB2-BD59-A6C34878D82A}">
+                    <a16:rowId xmlns:a16="http://schemas.microsoft.com/office/drawing/2014/main" val="2702673333"/>
+                  </a:ext>
+                </a:extLst>
+              </a:tr>
+              <a:tr h="370840">
+                <a:tc>
+                  <a:txBody>
+                    <a:bodyPr/>
+                    <a:lstStyle/>
+                    <a:p>
+                      <a:pPr algn="ctr" rtl="1"/>
+                      <a:r>
+                        <a:rPr lang="en-US" dirty="0"/>
+                        <a:t>List&lt;String&gt;</a:t>
+                      </a:r>
+                    </a:p>
+                  </a:txBody>
+                  <a:tcPr/>
+                </a:tc>
+                <a:tc>
+                  <a:txBody>
+                    <a:bodyPr/>
+                    <a:lstStyle/>
+                    <a:p>
+                      <a:pPr algn="ctr" rtl="1"/>
+                      <a:r>
+                        <a:rPr lang="he-IL" dirty="0"/>
+                        <a:t>סוג מקום</a:t>
+                      </a:r>
+                      <a:r>
+                        <a:rPr lang="he-IL" dirty="0">
+                          <a:solidFill>
+                            <a:schemeClr val="accent1">
+                              <a:lumMod val="75000"/>
+                            </a:schemeClr>
+                          </a:solidFill>
+                          <a:sym typeface="Wingdings" panose="05000000000000000000" pitchFamily="2" charset="2"/>
+                        </a:rPr>
+                        <a:t></a:t>
+                      </a:r>
+                      <a:endParaRPr lang="en-US" dirty="0"/>
+                    </a:p>
+                  </a:txBody>
+                  <a:tcPr/>
+                </a:tc>
+                <a:extLst>
+                  <a:ext uri="{0D108BD9-81ED-4DB2-BD59-A6C34878D82A}">
+                    <a16:rowId xmlns:a16="http://schemas.microsoft.com/office/drawing/2014/main" val="3680513811"/>
+                  </a:ext>
+                </a:extLst>
+              </a:tr>
+              <a:tr h="370840">
+                <a:tc>
+                  <a:txBody>
+                    <a:bodyPr/>
+                    <a:lstStyle/>
+                    <a:p>
+                      <a:pPr algn="ctr" rtl="1"/>
+                      <a:r>
+                        <a:rPr lang="en-US" dirty="0"/>
+                        <a:t>bool </a:t>
+                      </a:r>
+                    </a:p>
+                  </a:txBody>
+                  <a:tcPr/>
+                </a:tc>
+                <a:tc>
+                  <a:txBody>
+                    <a:bodyPr/>
+                    <a:lstStyle/>
+                    <a:p>
+                      <a:pPr algn="ctr" rtl="1"/>
+                      <a:r>
+                        <a:rPr lang="he-IL" dirty="0"/>
+                        <a:t>כשר / לא כשר</a:t>
+                      </a:r>
+                      <a:r>
+                        <a:rPr lang="he-IL" dirty="0">
+                          <a:solidFill>
+                            <a:schemeClr val="accent1">
+                              <a:lumMod val="75000"/>
+                            </a:schemeClr>
+                          </a:solidFill>
+                          <a:sym typeface="Wingdings" panose="05000000000000000000" pitchFamily="2" charset="2"/>
+                        </a:rPr>
+                        <a:t></a:t>
+                      </a:r>
+                      <a:endParaRPr lang="en-US" dirty="0"/>
+                    </a:p>
+                  </a:txBody>
+                  <a:tcPr/>
+                </a:tc>
+                <a:extLst>
+                  <a:ext uri="{0D108BD9-81ED-4DB2-BD59-A6C34878D82A}">
+                    <a16:rowId xmlns:a16="http://schemas.microsoft.com/office/drawing/2014/main" val="2905340695"/>
+                  </a:ext>
+                </a:extLst>
+              </a:tr>
+              <a:tr h="370840">
+                <a:tc>
+                  <a:txBody>
+                    <a:bodyPr/>
+                    <a:lstStyle/>
+                    <a:p>
+                      <a:pPr marL="0" marR="0" lvl="0" indent="0" algn="ctr" defTabSz="914400" rtl="1" eaLnBrk="1" fontAlgn="auto" latinLnBrk="0" hangingPunct="1">
+                        <a:lnSpc>
+                          <a:spcPct val="100000"/>
+                        </a:lnSpc>
+                        <a:spcBef>
+                          <a:spcPts val="0"/>
+                        </a:spcBef>
+                        <a:spcAft>
+                          <a:spcPts val="0"/>
+                        </a:spcAft>
+                        <a:buClrTx/>
+                        <a:buSzTx/>
+                        <a:buFontTx/>
+                        <a:buNone/>
+                        <a:tabLst/>
+                        <a:defRPr/>
+                      </a:pPr>
+                      <a:r>
+                        <a:rPr lang="en-US" dirty="0"/>
+                        <a:t>bool </a:t>
+                      </a:r>
+                    </a:p>
+                  </a:txBody>
+                  <a:tcPr/>
+                </a:tc>
+                <a:tc>
+                  <a:txBody>
+                    <a:bodyPr/>
+                    <a:lstStyle/>
+                    <a:p>
+                      <a:pPr algn="ctr" rtl="1"/>
+                      <a:r>
+                        <a:rPr lang="he-IL" dirty="0"/>
+                        <a:t>נמחק / לא נמחק</a:t>
+                      </a:r>
+                      <a:r>
+                        <a:rPr lang="he-IL" dirty="0">
+                          <a:solidFill>
+                            <a:srgbClr val="FF0000"/>
+                          </a:solidFill>
+                          <a:sym typeface="Wingdings" panose="05000000000000000000" pitchFamily="2" charset="2"/>
+                        </a:rPr>
+                        <a:t></a:t>
+                      </a:r>
+                      <a:endParaRPr lang="en-US" dirty="0"/>
+                    </a:p>
+                  </a:txBody>
+                  <a:tcPr/>
+                </a:tc>
+                <a:extLst>
+                  <a:ext uri="{0D108BD9-81ED-4DB2-BD59-A6C34878D82A}">
+                    <a16:rowId xmlns:a16="http://schemas.microsoft.com/office/drawing/2014/main" val="2192420244"/>
+                  </a:ext>
+                </a:extLst>
+              </a:tr>
+            </a:tbl>
+          </a:graphicData>
+        </a:graphic>
+      </p:graphicFrame>
+      <p:graphicFrame>
+        <p:nvGraphicFramePr>
+          <p:cNvPr id="6" name="Table 6">
+            <a:extLst>
+              <a:ext uri="{FF2B5EF4-FFF2-40B4-BE49-F238E27FC236}">
+                <a16:creationId xmlns:a16="http://schemas.microsoft.com/office/drawing/2014/main" id="{92133D0D-FBD8-4DF3-881E-0212F6C2C727}"/>
+              </a:ext>
+            </a:extLst>
+          </p:cNvPr>
+          <p:cNvGraphicFramePr>
+            <a:graphicFrameLocks noGrp="1"/>
+          </p:cNvGraphicFramePr>
+          <p:nvPr>
+            <p:extLst>
+              <p:ext uri="{D42A27DB-BD31-4B8C-83A1-F6EECF244321}">
+                <p14:modId xmlns:p14="http://schemas.microsoft.com/office/powerpoint/2010/main" val="3345467872"/>
+              </p:ext>
+            </p:extLst>
+          </p:nvPr>
+        </p:nvGraphicFramePr>
+        <p:xfrm>
+          <a:off x="2032000" y="1639445"/>
+          <a:ext cx="8128000" cy="370840"/>
+        </p:xfrm>
+        <a:graphic>
+          <a:graphicData uri="http://schemas.openxmlformats.org/drawingml/2006/table">
+            <a:tbl>
+              <a:tblPr firstRow="1" bandRow="1">
+                <a:tableStyleId>{5C22544A-7EE6-4342-B048-85BDC9FD1C3A}</a:tableStyleId>
+              </a:tblPr>
+              <a:tblGrid>
+                <a:gridCol w="8128000">
+                  <a:extLst>
+                    <a:ext uri="{9D8B030D-6E8A-4147-A177-3AD203B41FA5}">
+                      <a16:colId xmlns:a16="http://schemas.microsoft.com/office/drawing/2014/main" val="1834931227"/>
+                    </a:ext>
+                  </a:extLst>
+                </a:gridCol>
+              </a:tblGrid>
+              <a:tr h="370840">
+                <a:tc>
+                  <a:txBody>
+                    <a:bodyPr/>
+                    <a:lstStyle/>
+                    <a:p>
+                      <a:pPr algn="ctr" rtl="1"/>
+                      <a:r>
+                        <a:rPr lang="he-IL" dirty="0">
+                          <a:solidFill>
+                            <a:schemeClr val="tx1"/>
+                          </a:solidFill>
+                        </a:rPr>
+                        <a:t>אובייקט </a:t>
+                      </a:r>
+                      <a:r>
+                        <a:rPr lang="en-US" dirty="0">
+                          <a:solidFill>
+                            <a:schemeClr val="tx1"/>
+                          </a:solidFill>
+                        </a:rPr>
+                        <a:t>Location</a:t>
+                      </a:r>
+                    </a:p>
+                  </a:txBody>
+                  <a:tcPr>
+                    <a:solidFill>
+                      <a:schemeClr val="accent2">
+                        <a:lumMod val="40000"/>
+                        <a:lumOff val="60000"/>
+                      </a:schemeClr>
+                    </a:solidFill>
+                  </a:tcPr>
+                </a:tc>
+                <a:extLst>
+                  <a:ext uri="{0D108BD9-81ED-4DB2-BD59-A6C34878D82A}">
+                    <a16:rowId xmlns:a16="http://schemas.microsoft.com/office/drawing/2014/main" val="1972844829"/>
+                  </a:ext>
+                </a:extLst>
+              </a:tr>
+            </a:tbl>
+          </a:graphicData>
+        </a:graphic>
+      </p:graphicFrame>
+      <p:sp>
+        <p:nvSpPr>
+          <p:cNvPr id="7" name="TextBox 6">
+            <a:extLst>
+              <a:ext uri="{FF2B5EF4-FFF2-40B4-BE49-F238E27FC236}">
+                <a16:creationId xmlns:a16="http://schemas.microsoft.com/office/drawing/2014/main" id="{89C53DB2-E3A4-4224-8573-7DA0A051CCC1}"/>
+              </a:ext>
+            </a:extLst>
+          </p:cNvPr>
+          <p:cNvSpPr txBox="1"/>
+          <p:nvPr/>
+        </p:nvSpPr>
+        <p:spPr>
+          <a:xfrm>
+            <a:off x="1439694" y="648070"/>
+            <a:ext cx="1410038" cy="646331"/>
+          </a:xfrm>
+          <a:prstGeom prst="rect">
+            <a:avLst/>
+          </a:prstGeom>
+          <a:noFill/>
+          <a:ln w="38100">
+            <a:solidFill>
+              <a:schemeClr val="tx1"/>
+            </a:solidFill>
+          </a:ln>
+        </p:spPr>
+        <p:txBody>
+          <a:bodyPr wrap="square" rtlCol="0">
+            <a:spAutoFit/>
+          </a:bodyPr>
+          <a:lstStyle/>
+          <a:p>
+            <a:pPr algn="r" rtl="1"/>
+            <a:r>
+              <a:rPr lang="he-IL" dirty="0"/>
+              <a:t>מוסתר	</a:t>
+            </a:r>
+            <a:r>
+              <a:rPr lang="he-IL" dirty="0">
+                <a:solidFill>
+                  <a:srgbClr val="FF0000"/>
+                </a:solidFill>
+                <a:sym typeface="Wingdings" panose="05000000000000000000" pitchFamily="2" charset="2"/>
+              </a:rPr>
+              <a:t></a:t>
+            </a:r>
+            <a:endParaRPr lang="he-IL" dirty="0">
+              <a:solidFill>
+                <a:srgbClr val="FF0000"/>
+              </a:solidFill>
+            </a:endParaRPr>
+          </a:p>
+          <a:p>
+            <a:pPr algn="r" rtl="1"/>
+            <a:r>
+              <a:rPr lang="he-IL" dirty="0"/>
+              <a:t>פומבי	</a:t>
+            </a:r>
+            <a:r>
+              <a:rPr lang="he-IL" dirty="0">
+                <a:solidFill>
+                  <a:schemeClr val="accent1">
+                    <a:lumMod val="75000"/>
+                  </a:schemeClr>
+                </a:solidFill>
+                <a:sym typeface="Wingdings" panose="05000000000000000000" pitchFamily="2" charset="2"/>
+              </a:rPr>
+              <a:t></a:t>
+            </a:r>
+            <a:endParaRPr lang="en-US" dirty="0">
+              <a:solidFill>
+                <a:schemeClr val="accent1">
+                  <a:lumMod val="75000"/>
+                </a:schemeClr>
+              </a:solidFill>
+            </a:endParaRPr>
+          </a:p>
+        </p:txBody>
+      </p:sp>
+    </p:spTree>
+    <p:extLst>
+      <p:ext uri="{BB962C8B-B14F-4D97-AF65-F5344CB8AC3E}">
+        <p14:creationId xmlns:p14="http://schemas.microsoft.com/office/powerpoint/2010/main" val="1318338086"/>
+      </p:ext>
+    </p:extLst>
+  </p:cSld>
+  <p:clrMapOvr>
+    <a:masterClrMapping/>
+  </p:clrMapOvr>
+</p:sld>
+</file>
+
+<file path=ppt/slides/slide15.xml><?xml version="1.0" encoding="utf-8"?>
+<p:sld xmlns:a="http://schemas.openxmlformats.org/drawingml/2006/main" xmlns:r="http://schemas.openxmlformats.org/officeDocument/2006/relationships" xmlns:p="http://schemas.openxmlformats.org/presentationml/2006/main">
+  <p:cSld>
+    <p:spTree>
+      <p:nvGrpSpPr>
+        <p:cNvPr id="1" name=""/>
+        <p:cNvGrpSpPr/>
+        <p:nvPr/>
+      </p:nvGrpSpPr>
+      <p:grpSpPr>
+        <a:xfrm>
+          <a:off x="0" y="0"/>
+          <a:ext cx="0" cy="0"/>
+          <a:chOff x="0" y="0"/>
+          <a:chExt cx="0" cy="0"/>
+        </a:xfrm>
+      </p:grpSpPr>
+      <p:sp>
+        <p:nvSpPr>
+          <p:cNvPr id="2" name="Title 1">
+            <a:extLst>
+              <a:ext uri="{FF2B5EF4-FFF2-40B4-BE49-F238E27FC236}">
+                <a16:creationId xmlns:a16="http://schemas.microsoft.com/office/drawing/2014/main" id="{43551F67-0887-4CF3-A558-3259299FB54E}"/>
+              </a:ext>
+            </a:extLst>
+          </p:cNvPr>
+          <p:cNvSpPr>
+            <a:spLocks noGrp="1"/>
+          </p:cNvSpPr>
+          <p:nvPr>
+            <p:ph type="title"/>
+          </p:nvPr>
+        </p:nvSpPr>
         <p:spPr>
           <a:xfrm>
             <a:off x="838200" y="82389"/>
@@ -7376,10 +9016,26 @@
           <a:p>
             <a:pPr algn="ctr" rtl="1"/>
             <a:r>
-              <a:rPr lang="he-IL" dirty="0"/>
+              <a:rPr lang="he-IL" b="1" u="sng" dirty="0">
+                <a:effectLst>
+                  <a:outerShdw blurRad="38100" dist="38100" dir="2700000" algn="tl">
+                    <a:srgbClr val="000000">
+                      <a:alpha val="43137"/>
+                    </a:srgbClr>
+                  </a:outerShdw>
+                </a:effectLst>
+              </a:rPr>
               <a:t>חלון ראשי צאט</a:t>
             </a:r>
-            <a:endParaRPr lang="en-US" dirty="0"/>
+            <a:endParaRPr lang="en-US" b="1" u="sng" dirty="0">
+              <a:effectLst>
+                <a:outerShdw blurRad="38100" dist="38100" dir="2700000" algn="tl">
+                  <a:srgbClr val="000000">
+                    <a:alpha val="43137"/>
+                  </a:srgbClr>
+                </a:outerShdw>
+              </a:effectLst>
+            </a:endParaRPr>
           </a:p>
         </p:txBody>
       </p:sp>
@@ -7451,8 +9107,8 @@
         </p:nvSpPr>
         <p:spPr>
           <a:xfrm>
-            <a:off x="1717130" y="1407952"/>
-            <a:ext cx="3614036" cy="1477328"/>
+            <a:off x="838201" y="1407952"/>
+            <a:ext cx="5775664" cy="2862322"/>
           </a:xfrm>
           <a:prstGeom prst="rect">
             <a:avLst/>
@@ -7476,22 +9132,75 @@
             <a:pPr algn="r" rtl="1"/>
             <a:r>
               <a:rPr lang="he-IL" dirty="0"/>
-              <a:t> - יהיה צאטים פתוחים לשיחה</a:t>
-            </a:r>
-          </a:p>
-          <a:p>
-            <a:pPr algn="r" rtl="1"/>
-            <a:r>
-              <a:rPr lang="he-IL" dirty="0"/>
-              <a:t> - יהיה צאטים סגורים לשיחה</a:t>
-            </a:r>
-          </a:p>
-          <a:p>
-            <a:pPr algn="r" rtl="1"/>
-            <a:r>
-              <a:rPr lang="he-IL" dirty="0"/>
-              <a:t>יהיה אפשרות לדווח על כל אחד מהצאטים</a:t>
-            </a:r>
+              <a:t>-   יהיה צאטים פתוחים לשיחה - שחור</a:t>
+            </a:r>
+          </a:p>
+          <a:p>
+            <a:pPr marL="285750" indent="-285750" algn="r" rtl="1">
+              <a:buFontTx/>
+              <a:buChar char="-"/>
+            </a:pPr>
+            <a:r>
+              <a:rPr lang="he-IL" dirty="0"/>
+              <a:t>יהיה צאטים סגורים לשיחה – אפור</a:t>
+            </a:r>
+          </a:p>
+          <a:p>
+            <a:pPr marL="285750" indent="-285750" algn="r" rtl="1">
+              <a:buFontTx/>
+              <a:buChar char="-"/>
+            </a:pPr>
+            <a:r>
+              <a:rPr lang="he-IL" dirty="0"/>
+              <a:t>יהיה אפשרות לדווח על כל אחד מהצ'אטים</a:t>
+            </a:r>
+          </a:p>
+          <a:p>
+            <a:pPr marL="742950" lvl="1" indent="-285750" algn="r" rtl="1">
+              <a:buFontTx/>
+              <a:buChar char="-"/>
+            </a:pPr>
+            <a:r>
+              <a:rPr lang="he-IL" dirty="0"/>
+              <a:t>לחיצה ארוכה על השורה שלו</a:t>
+            </a:r>
+          </a:p>
+          <a:p>
+            <a:pPr marL="285750" indent="-285750" algn="r" rtl="1">
+              <a:buFontTx/>
+              <a:buChar char="-"/>
+            </a:pPr>
+            <a:r>
+              <a:rPr lang="he-IL" dirty="0"/>
+              <a:t>אפשרות לסגירת צ'אט מכול אחד מהצדדים</a:t>
+            </a:r>
+          </a:p>
+          <a:p>
+            <a:pPr marL="285750" indent="-285750" algn="r" rtl="1">
+              <a:buFontTx/>
+              <a:buChar char="-"/>
+            </a:pPr>
+            <a:r>
+              <a:rPr lang="he-IL" dirty="0"/>
+              <a:t>אפשרות מחיקת צ'אט</a:t>
+            </a:r>
+          </a:p>
+          <a:p>
+            <a:pPr marL="285750" indent="-285750" algn="r" rtl="1">
+              <a:buFontTx/>
+              <a:buChar char="-"/>
+            </a:pPr>
+            <a:r>
+              <a:rPr lang="he-IL" dirty="0"/>
+              <a:t>לחיצה על צ'אט פתוח תוביל למסך "חלון צ'אט" עם המשתמש המדובר</a:t>
+            </a:r>
+          </a:p>
+          <a:p>
+            <a:pPr marL="285750" indent="-285750" algn="r" rtl="1">
+              <a:buFontTx/>
+              <a:buChar char="-"/>
+            </a:pPr>
+            <a:endParaRPr lang="he-IL" dirty="0"/>
           </a:p>
         </p:txBody>
       </p:sp>
@@ -8277,7 +9986,7 @@
 </p:sld>
 </file>
 
-<file path=ppt/slides/slide15.xml><?xml version="1.0" encoding="utf-8"?>
+<file path=ppt/slides/slide16.xml><?xml version="1.0" encoding="utf-8"?>
 <p:sld xmlns:a="http://schemas.openxmlformats.org/drawingml/2006/main" xmlns:r="http://schemas.openxmlformats.org/officeDocument/2006/relationships" xmlns:p="http://schemas.openxmlformats.org/presentationml/2006/main">
   <p:cSld>
     <p:spTree>
@@ -8322,10 +10031,26 @@
           <a:p>
             <a:pPr algn="ctr" rtl="1"/>
             <a:r>
-              <a:rPr lang="he-IL" dirty="0"/>
-              <a:t>חלון ראשי צאט</a:t>
-            </a:r>
-            <a:endParaRPr lang="en-US" dirty="0"/>
+              <a:rPr lang="he-IL" b="1" u="sng" dirty="0">
+                <a:effectLst>
+                  <a:outerShdw blurRad="38100" dist="38100" dir="2700000" algn="tl">
+                    <a:srgbClr val="000000">
+                      <a:alpha val="43137"/>
+                    </a:srgbClr>
+                  </a:outerShdw>
+                </a:effectLst>
+              </a:rPr>
+              <a:t>חלון צאט</a:t>
+            </a:r>
+            <a:endParaRPr lang="en-US" b="1" u="sng" dirty="0">
+              <a:effectLst>
+                <a:outerShdw blurRad="38100" dist="38100" dir="2700000" algn="tl">
+                  <a:srgbClr val="000000">
+                    <a:alpha val="43137"/>
+                  </a:srgbClr>
+                </a:outerShdw>
+              </a:effectLst>
+            </a:endParaRPr>
           </a:p>
         </p:txBody>
       </p:sp>
@@ -8397,8 +10122,8 @@
         </p:nvSpPr>
         <p:spPr>
           <a:xfrm>
-            <a:off x="1717130" y="1407952"/>
-            <a:ext cx="3614036" cy="1477328"/>
+            <a:off x="1717129" y="1407952"/>
+            <a:ext cx="4275297" cy="2031325"/>
           </a:xfrm>
           <a:prstGeom prst="rect">
             <a:avLst/>
@@ -8422,22 +10147,60 @@
             <a:pPr algn="r" rtl="1"/>
             <a:r>
               <a:rPr lang="he-IL" dirty="0"/>
-              <a:t> - יהיה צאטים פתוחים לשיחה</a:t>
+              <a:t>-   יהיה צאטים פתוחים לשיחה – אפשר להגיב</a:t>
+            </a:r>
+          </a:p>
+          <a:p>
+            <a:pPr marL="285750" indent="-285750" algn="r" rtl="1">
+              <a:buFontTx/>
+              <a:buChar char="-"/>
+            </a:pPr>
+            <a:r>
+              <a:rPr lang="he-IL" dirty="0"/>
+              <a:t>יהיה צאטים סגורים לשיחה – הגבה חסומה</a:t>
+            </a:r>
+          </a:p>
+          <a:p>
+            <a:pPr marL="285750" indent="-285750" algn="r" rtl="1">
+              <a:buFontTx/>
+              <a:buChar char="-"/>
+            </a:pPr>
+            <a:r>
+              <a:rPr lang="he-IL" dirty="0"/>
+              <a:t>לחיצה על כפתור ה</a:t>
+            </a:r>
+            <a:r>
+              <a:rPr lang="en-US" dirty="0"/>
+              <a:t>i </a:t>
+            </a:r>
+            <a:r>
+              <a:rPr lang="he-IL" dirty="0"/>
+              <a:t> תאפשר:</a:t>
+            </a:r>
+          </a:p>
+          <a:p>
+            <a:pPr marL="742950" lvl="1" indent="-285750" algn="r" rtl="1">
+              <a:buFontTx/>
+              <a:buChar char="-"/>
+            </a:pPr>
+            <a:r>
+              <a:rPr lang="he-IL" dirty="0"/>
+              <a:t>לדווח על משתמש</a:t>
+            </a:r>
+          </a:p>
+          <a:p>
+            <a:pPr marL="742950" lvl="1" indent="-285750" algn="r" rtl="1">
+              <a:buFontTx/>
+              <a:buChar char="-"/>
+            </a:pPr>
+            <a:r>
+              <a:rPr lang="he-IL" dirty="0"/>
+              <a:t>לסגור צ'אט</a:t>
             </a:r>
           </a:p>
           <a:p>
             <a:pPr algn="r" rtl="1"/>
-            <a:r>
-              <a:rPr lang="he-IL" dirty="0"/>
-              <a:t> - יהיה צאטים סגורים לשיחה</a:t>
-            </a:r>
-          </a:p>
-          <a:p>
-            <a:pPr algn="r" rtl="1"/>
-            <a:r>
-              <a:rPr lang="he-IL" dirty="0"/>
-              <a:t>יהיה אפשרות לדווח על כל אחד מהצאטים</a:t>
-            </a:r>
+            <a:endParaRPr lang="he-IL" dirty="0"/>
           </a:p>
         </p:txBody>
       </p:sp>
@@ -9451,6 +11214,41 @@
           </a:p>
         </p:txBody>
       </p:sp>
+      <p:sp>
+        <p:nvSpPr>
+          <p:cNvPr id="5" name="TextBox 4">
+            <a:extLst>
+              <a:ext uri="{FF2B5EF4-FFF2-40B4-BE49-F238E27FC236}">
+                <a16:creationId xmlns:a16="http://schemas.microsoft.com/office/drawing/2014/main" id="{7EEF5484-A7D4-49A2-ABFB-ADBD46F8BBCB}"/>
+              </a:ext>
+            </a:extLst>
+          </p:cNvPr>
+          <p:cNvSpPr txBox="1"/>
+          <p:nvPr/>
+        </p:nvSpPr>
+        <p:spPr>
+          <a:xfrm>
+            <a:off x="10259135" y="1326940"/>
+            <a:ext cx="237566" cy="369332"/>
+          </a:xfrm>
+          <a:prstGeom prst="rect">
+            <a:avLst/>
+          </a:prstGeom>
+          <a:noFill/>
+        </p:spPr>
+        <p:txBody>
+          <a:bodyPr wrap="none" rtlCol="0">
+            <a:spAutoFit/>
+          </a:bodyPr>
+          <a:lstStyle/>
+          <a:p>
+            <a:r>
+              <a:rPr lang="en-US" dirty="0"/>
+              <a:t>i</a:t>
+            </a:r>
+          </a:p>
+        </p:txBody>
+      </p:sp>
     </p:spTree>
     <p:extLst>
       <p:ext uri="{BB962C8B-B14F-4D97-AF65-F5344CB8AC3E}">
@@ -10379,9 +12177,26 @@
           <a:p>
             <a:pPr algn="ctr" rtl="1"/>
             <a:r>
-              <a:rPr lang="en-US" dirty="0"/>
-              <a:t>Welcome</a:t>
-            </a:r>
+              <a:rPr lang="he-IL" b="1" u="sng" dirty="0">
+                <a:effectLst>
+                  <a:outerShdw blurRad="38100" dist="38100" dir="2700000" algn="tl">
+                    <a:srgbClr val="000000">
+                      <a:alpha val="43137"/>
+                    </a:srgbClr>
+                  </a:outerShdw>
+                </a:effectLst>
+              </a:rPr>
+              <a:t>מסך טעינה</a:t>
+            </a:r>
+            <a:endParaRPr lang="en-US" b="1" u="sng" dirty="0">
+              <a:effectLst>
+                <a:outerShdw blurRad="38100" dist="38100" dir="2700000" algn="tl">
+                  <a:srgbClr val="000000">
+                    <a:alpha val="43137"/>
+                  </a:srgbClr>
+                </a:outerShdw>
+              </a:effectLst>
+            </a:endParaRPr>
           </a:p>
         </p:txBody>
       </p:sp>
@@ -10541,96 +12356,6 @@
           </a:prstGeom>
         </p:spPr>
       </p:pic>
-      <p:sp>
-        <p:nvSpPr>
-          <p:cNvPr id="3" name="TextBox 2">
-            <a:extLst>
-              <a:ext uri="{FF2B5EF4-FFF2-40B4-BE49-F238E27FC236}">
-                <a16:creationId xmlns:a16="http://schemas.microsoft.com/office/drawing/2014/main" id="{F605B9E2-2F11-4584-8F2E-2C2669F586FF}"/>
-              </a:ext>
-            </a:extLst>
-          </p:cNvPr>
-          <p:cNvSpPr txBox="1"/>
-          <p:nvPr/>
-        </p:nvSpPr>
-        <p:spPr>
-          <a:xfrm>
-            <a:off x="8888027" y="4071955"/>
-            <a:ext cx="1127464" cy="369332"/>
-          </a:xfrm>
-          <a:prstGeom prst="rect">
-            <a:avLst/>
-          </a:prstGeom>
-          <a:noFill/>
-          <a:ln w="38100">
-            <a:solidFill>
-              <a:schemeClr val="bg1"/>
-            </a:solidFill>
-          </a:ln>
-        </p:spPr>
-        <p:txBody>
-          <a:bodyPr wrap="square" rtlCol="0">
-            <a:spAutoFit/>
-          </a:bodyPr>
-          <a:lstStyle/>
-          <a:p>
-            <a:pPr algn="ctr"/>
-            <a:r>
-              <a:rPr lang="en-US" dirty="0">
-                <a:solidFill>
-                  <a:schemeClr val="bg1"/>
-                </a:solidFill>
-              </a:rPr>
-              <a:t>Sign In</a:t>
-            </a:r>
-          </a:p>
-        </p:txBody>
-      </p:sp>
-      <p:sp>
-        <p:nvSpPr>
-          <p:cNvPr id="8" name="TextBox 7">
-            <a:extLst>
-              <a:ext uri="{FF2B5EF4-FFF2-40B4-BE49-F238E27FC236}">
-                <a16:creationId xmlns:a16="http://schemas.microsoft.com/office/drawing/2014/main" id="{65A2D1C6-C038-4A4C-92A6-241452840724}"/>
-              </a:ext>
-            </a:extLst>
-          </p:cNvPr>
-          <p:cNvSpPr txBox="1"/>
-          <p:nvPr/>
-        </p:nvSpPr>
-        <p:spPr>
-          <a:xfrm>
-            <a:off x="8888027" y="4730266"/>
-            <a:ext cx="1127464" cy="369332"/>
-          </a:xfrm>
-          <a:prstGeom prst="rect">
-            <a:avLst/>
-          </a:prstGeom>
-          <a:noFill/>
-          <a:ln w="38100">
-            <a:solidFill>
-              <a:schemeClr val="bg1"/>
-            </a:solidFill>
-          </a:ln>
-        </p:spPr>
-        <p:txBody>
-          <a:bodyPr wrap="square" rtlCol="0">
-            <a:spAutoFit/>
-          </a:bodyPr>
-          <a:lstStyle/>
-          <a:p>
-            <a:pPr algn="ctr"/>
-            <a:r>
-              <a:rPr lang="en-US" dirty="0">
-                <a:solidFill>
-                  <a:schemeClr val="bg1"/>
-                </a:solidFill>
-              </a:rPr>
-              <a:t>Log In</a:t>
-            </a:r>
-          </a:p>
-        </p:txBody>
-      </p:sp>
     </p:spTree>
     <p:extLst>
       <p:ext uri="{BB962C8B-B14F-4D97-AF65-F5344CB8AC3E}">
@@ -10689,10 +12414,26 @@
           <a:p>
             <a:pPr algn="ctr" rtl="1"/>
             <a:r>
-              <a:rPr lang="en-US"/>
-              <a:t>Pre-login</a:t>
-            </a:r>
-            <a:endParaRPr lang="en-US" dirty="0"/>
+              <a:rPr lang="he-IL" b="1" u="sng" dirty="0">
+                <a:effectLst>
+                  <a:outerShdw blurRad="38100" dist="38100" dir="2700000" algn="tl">
+                    <a:srgbClr val="000000">
+                      <a:alpha val="43137"/>
+                    </a:srgbClr>
+                  </a:outerShdw>
+                </a:effectLst>
+              </a:rPr>
+              <a:t>מסך כניסה</a:t>
+            </a:r>
+            <a:endParaRPr lang="en-US" b="1" u="sng" dirty="0">
+              <a:effectLst>
+                <a:outerShdw blurRad="38100" dist="38100" dir="2700000" algn="tl">
+                  <a:srgbClr val="000000">
+                    <a:alpha val="43137"/>
+                  </a:srgbClr>
+                </a:outerShdw>
+              </a:effectLst>
+            </a:endParaRPr>
           </a:p>
         </p:txBody>
       </p:sp>
@@ -10765,7 +12506,7 @@
         <p:spPr>
           <a:xfrm>
             <a:off x="559292" y="1634787"/>
-            <a:ext cx="6258757" cy="1477328"/>
+            <a:ext cx="6258757" cy="2308324"/>
           </a:xfrm>
           <a:prstGeom prst="rect">
             <a:avLst/>
@@ -10780,58 +12521,82 @@
           <a:p>
             <a:pPr algn="r" rtl="1"/>
             <a:r>
-              <a:rPr lang="he-IL"/>
-              <a:t>פונקציונליות:</a:t>
-            </a:r>
-            <a:endParaRPr lang="en-US"/>
+              <a:rPr lang="he-IL" dirty="0"/>
+              <a:t>לחיצה על כפתור 'התחבר באמצעות </a:t>
+            </a:r>
+            <a:r>
+              <a:rPr lang="he-IL" dirty="0" err="1"/>
+              <a:t>פייסבוק</a:t>
+            </a:r>
+            <a:r>
+              <a:rPr lang="he-IL" dirty="0"/>
+              <a:t>' תפתח את ה</a:t>
+            </a:r>
+            <a:br>
+              <a:rPr lang="en-US" dirty="0"/>
+            </a:br>
+            <a:r>
+              <a:rPr lang="en-GB" dirty="0"/>
+              <a:t>Facebook login prompt</a:t>
+            </a:r>
           </a:p>
           <a:p>
             <a:pPr algn="r" rtl="1"/>
             <a:r>
-              <a:rPr lang="he-IL"/>
-              <a:t> - לחיצה על 'יש לי יוזר' תביא אותו </a:t>
-            </a:r>
-            <a:r>
-              <a:rPr lang="he-IL" b="1"/>
-              <a:t>לדף </a:t>
-            </a:r>
-            <a:r>
-              <a:rPr lang="en-US" b="1"/>
-              <a:t>LOGIN</a:t>
-            </a:r>
-            <a:endParaRPr lang="he-IL" b="1"/>
+              <a:rPr lang="he-IL" dirty="0"/>
+              <a:t>ותחבר את המשתמש דרך חשבון </a:t>
+            </a:r>
+            <a:r>
+              <a:rPr lang="he-IL" dirty="0" err="1"/>
+              <a:t>הפייסבוק</a:t>
+            </a:r>
+            <a:r>
+              <a:rPr lang="he-IL" dirty="0"/>
+              <a:t> שלו,</a:t>
+            </a:r>
           </a:p>
           <a:p>
             <a:pPr algn="r" rtl="1"/>
             <a:r>
-              <a:rPr lang="he-IL"/>
-              <a:t> - לחיצה על רוצה לייצור יוזר</a:t>
-            </a:r>
-          </a:p>
-          <a:p>
-            <a:pPr marL="742950" lvl="1" indent="-285750" algn="r" rtl="1">
-              <a:buFontTx/>
-              <a:buChar char="-"/>
-            </a:pPr>
-            <a:r>
-              <a:rPr lang="he-IL"/>
-              <a:t>תשלח אותו להתחבר דרך פייסבוק</a:t>
-            </a:r>
-          </a:p>
-          <a:p>
-            <a:pPr marL="742950" lvl="1" indent="-285750" algn="r" rtl="1">
-              <a:buFontTx/>
-              <a:buChar char="-"/>
-            </a:pPr>
-            <a:r>
-              <a:rPr lang="he-IL"/>
-              <a:t>ולאחר מכן </a:t>
-            </a:r>
-            <a:r>
-              <a:rPr lang="he-IL" b="1"/>
-              <a:t>לדף רישום</a:t>
-            </a:r>
-            <a:endParaRPr lang="he-IL" b="1" dirty="0"/>
+              <a:rPr lang="he-IL" b="1" dirty="0"/>
+              <a:t>ותחזיר לנו את ה</a:t>
+            </a:r>
+            <a:r>
+              <a:rPr lang="en-GB" b="1" dirty="0"/>
+              <a:t>User ID</a:t>
+            </a:r>
+            <a:r>
+              <a:rPr lang="he-IL" b="1" dirty="0"/>
+              <a:t>, לשימוש עתידי שלנו</a:t>
+            </a:r>
+          </a:p>
+          <a:p>
+            <a:pPr algn="r" rtl="1"/>
+            <a:r>
+              <a:rPr lang="he-IL" dirty="0"/>
+              <a:t>- אנחנו נבדוק האם המשתמש קיים, במידה וכן:</a:t>
+            </a:r>
+          </a:p>
+          <a:p>
+            <a:pPr algn="r" rtl="1"/>
+            <a:r>
+              <a:rPr lang="he-IL" dirty="0"/>
+              <a:t>	-- נשלח אותו למסך של המפה</a:t>
+            </a:r>
+          </a:p>
+          <a:p>
+            <a:pPr algn="r" rtl="1"/>
+            <a:r>
+              <a:rPr lang="he-IL" dirty="0"/>
+              <a:t>	-- במידה ולא קיים, נעביר למסך רישום על מנת ליצור את</a:t>
+            </a:r>
+            <a:br>
+              <a:rPr lang="en-US" dirty="0"/>
+            </a:br>
+            <a:r>
+              <a:rPr lang="he-IL" dirty="0"/>
+              <a:t>	    המשתמש.</a:t>
+            </a:r>
           </a:p>
         </p:txBody>
       </p:sp>
@@ -10882,71 +12647,17 @@
           <a:p>
             <a:pPr algn="ctr"/>
             <a:r>
-              <a:rPr lang="en-US" dirty="0"/>
-              <a:t> </a:t>
-            </a:r>
-            <a:r>
-              <a:rPr lang="he-IL" dirty="0"/>
-              <a:t>יש לי יוזר</a:t>
-            </a:r>
-            <a:endParaRPr lang="en-US" dirty="0"/>
-          </a:p>
-        </p:txBody>
-      </p:sp>
-      <p:sp>
-        <p:nvSpPr>
-          <p:cNvPr id="12" name="Rectangle 11">
-            <a:extLst>
-              <a:ext uri="{FF2B5EF4-FFF2-40B4-BE49-F238E27FC236}">
-                <a16:creationId xmlns:a16="http://schemas.microsoft.com/office/drawing/2014/main" id="{CE55A255-2862-4F24-AAAE-F8676B64E167}"/>
-              </a:ext>
-            </a:extLst>
-          </p:cNvPr>
-          <p:cNvSpPr/>
-          <p:nvPr/>
-        </p:nvSpPr>
-        <p:spPr>
-          <a:xfrm>
-            <a:off x="8393414" y="4652884"/>
-            <a:ext cx="2201662" cy="423909"/>
-          </a:xfrm>
-          <a:prstGeom prst="rect">
-            <a:avLst/>
-          </a:prstGeom>
-          <a:solidFill>
-            <a:schemeClr val="accent1"/>
-          </a:solidFill>
-          <a:ln>
-            <a:noFill/>
-          </a:ln>
-        </p:spPr>
-        <p:style>
-          <a:lnRef idx="3">
-            <a:schemeClr val="lt1"/>
-          </a:lnRef>
-          <a:fillRef idx="1">
-            <a:schemeClr val="accent6"/>
-          </a:fillRef>
-          <a:effectRef idx="1">
-            <a:schemeClr val="accent6"/>
-          </a:effectRef>
-          <a:fontRef idx="minor">
-            <a:schemeClr val="lt1"/>
-          </a:fontRef>
-        </p:style>
-        <p:txBody>
-          <a:bodyPr rtlCol="0" anchor="ctr"/>
-          <a:lstStyle/>
-          <a:p>
-            <a:pPr algn="ctr" rtl="1"/>
-            <a:r>
-              <a:rPr lang="he-IL" dirty="0"/>
-              <a:t>רוצה ליצור יוזר </a:t>
-            </a:r>
-            <a:r>
-              <a:rPr lang="en-US" dirty="0"/>
-              <a:t>(F)</a:t>
-            </a:r>
+              <a:rPr lang="he-IL" sz="1200" dirty="0"/>
+              <a:t>התחבר באמצעות </a:t>
+            </a:r>
+          </a:p>
+          <a:p>
+            <a:pPr algn="ctr"/>
+            <a:r>
+              <a:rPr lang="he-IL" sz="1200" dirty="0" err="1"/>
+              <a:t>פייסבוק</a:t>
+            </a:r>
+            <a:endParaRPr lang="en-US" sz="1200" dirty="0"/>
           </a:p>
         </p:txBody>
       </p:sp>
@@ -11000,7 +12711,7 @@
 </file>
 
 <file path=ppt/slides/slide9.xml><?xml version="1.0" encoding="utf-8"?>
-<p:sld xmlns:a="http://schemas.openxmlformats.org/drawingml/2006/main" xmlns:r="http://schemas.openxmlformats.org/officeDocument/2006/relationships" xmlns:p="http://schemas.openxmlformats.org/presentationml/2006/main" show="0">
+<p:sld xmlns:a="http://schemas.openxmlformats.org/drawingml/2006/main" xmlns:r="http://schemas.openxmlformats.org/officeDocument/2006/relationships" xmlns:p="http://schemas.openxmlformats.org/presentationml/2006/main">
   <p:cSld>
     <p:spTree>
       <p:nvGrpSpPr>
@@ -11021,7 +12732,7 @@
           <p:cNvPr id="2" name="Title 1">
             <a:extLst>
               <a:ext uri="{FF2B5EF4-FFF2-40B4-BE49-F238E27FC236}">
-                <a16:creationId xmlns:a16="http://schemas.microsoft.com/office/drawing/2014/main" id="{43551F67-0887-4CF3-A558-3259299FB54E}"/>
+                <a16:creationId xmlns:a16="http://schemas.microsoft.com/office/drawing/2014/main" id="{5BBA1555-7F39-4134-A5FC-0AD82548D93F}"/>
               </a:ext>
             </a:extLst>
           </p:cNvPr>
@@ -11032,30 +12743,220 @@
             <p:ph type="title"/>
           </p:nvPr>
         </p:nvSpPr>
+        <p:spPr/>
+        <p:txBody>
+          <a:bodyPr/>
+          <a:lstStyle/>
+          <a:p>
+            <a:pPr algn="r" rtl="1"/>
+            <a:r>
+              <a:rPr lang="he-IL" dirty="0"/>
+              <a:t>תכונות האובייקט של המשתמש - </a:t>
+            </a:r>
+            <a:r>
+              <a:rPr lang="en-GB" dirty="0"/>
+              <a:t>User</a:t>
+            </a:r>
+            <a:endParaRPr lang="en-US" dirty="0"/>
+          </a:p>
+        </p:txBody>
+      </p:sp>
+      <p:sp>
+        <p:nvSpPr>
+          <p:cNvPr id="6" name="TextBox 5">
+            <a:extLst>
+              <a:ext uri="{FF2B5EF4-FFF2-40B4-BE49-F238E27FC236}">
+                <a16:creationId xmlns:a16="http://schemas.microsoft.com/office/drawing/2014/main" id="{20A84E70-2D58-4365-9C3A-07C9E004CBD9}"/>
+              </a:ext>
+            </a:extLst>
+          </p:cNvPr>
+          <p:cNvSpPr txBox="1"/>
+          <p:nvPr/>
+        </p:nvSpPr>
         <p:spPr>
           <a:xfrm>
-            <a:off x="838200" y="82389"/>
-            <a:ext cx="10515600" cy="1325563"/>
-          </a:xfrm>
-        </p:spPr>
-        <p:txBody>
-          <a:bodyPr/>
-          <a:lstStyle/>
-          <a:p>
-            <a:pPr algn="ctr" rtl="1"/>
+            <a:off x="2734322" y="1690688"/>
+            <a:ext cx="8343309" cy="3139321"/>
+          </a:xfrm>
+          <a:prstGeom prst="rect">
+            <a:avLst/>
+          </a:prstGeom>
+          <a:noFill/>
+        </p:spPr>
+        <p:txBody>
+          <a:bodyPr wrap="square" rtlCol="0">
+            <a:spAutoFit/>
+          </a:bodyPr>
+          <a:lstStyle/>
+          <a:p>
+            <a:pPr marL="285750" indent="-285750" algn="r" rtl="1">
+              <a:buFontTx/>
+              <a:buChar char="-"/>
+            </a:pPr>
+            <a:r>
+              <a:rPr lang="he-IL" dirty="0"/>
+              <a:t>מחרוזת שתייצג את ה </a:t>
+            </a:r>
+            <a:r>
+              <a:rPr lang="en-US" dirty="0" err="1"/>
+              <a:t>UserID</a:t>
+            </a:r>
+            <a:endParaRPr lang="en-US" dirty="0"/>
+          </a:p>
+          <a:p>
+            <a:pPr marL="285750" indent="-285750" algn="r" rtl="1">
+              <a:buFontTx/>
+              <a:buChar char="-"/>
+            </a:pPr>
+            <a:r>
+              <a:rPr lang="he-IL" dirty="0"/>
+              <a:t>שם מלא / כינוי</a:t>
+            </a:r>
+          </a:p>
+          <a:p>
+            <a:pPr marL="285750" indent="-285750" algn="r" rtl="1">
+              <a:buFontTx/>
+              <a:buChar char="-"/>
+            </a:pPr>
+            <a:r>
+              <a:rPr lang="he-IL" dirty="0"/>
+              <a:t>גיל</a:t>
+            </a:r>
+          </a:p>
+          <a:p>
+            <a:pPr marL="285750" indent="-285750" algn="r" rtl="1">
+              <a:buFontTx/>
+              <a:buChar char="-"/>
+            </a:pPr>
+            <a:r>
+              <a:rPr lang="he-IL" dirty="0"/>
+              <a:t>תמצית</a:t>
+            </a:r>
+          </a:p>
+          <a:p>
+            <a:pPr marL="285750" indent="-285750" algn="r" rtl="1">
+              <a:buFontTx/>
+              <a:buChar char="-"/>
+            </a:pPr>
+            <a:r>
+              <a:rPr lang="he-IL" dirty="0"/>
+              <a:t>תמונת פרופיל </a:t>
+            </a:r>
+            <a:r>
+              <a:rPr lang="he-IL" dirty="0" err="1"/>
+              <a:t>מהפייסבוק</a:t>
+            </a:r>
+            <a:endParaRPr lang="he-IL" dirty="0"/>
+          </a:p>
+          <a:p>
+            <a:pPr marL="285750" indent="-285750" algn="r" rtl="1">
+              <a:buFontTx/>
+              <a:buChar char="-"/>
+            </a:pPr>
+            <a:r>
+              <a:rPr lang="he-IL" dirty="0"/>
+              <a:t>מין</a:t>
+            </a:r>
+          </a:p>
+          <a:p>
+            <a:pPr marL="285750" indent="-285750" algn="r" rtl="1">
+              <a:buFontTx/>
+              <a:buChar char="-"/>
+            </a:pPr>
+            <a:r>
+              <a:rPr lang="he-IL" dirty="0"/>
+              <a:t>תאריך רישום בצורה הבאה: "</a:t>
+            </a:r>
+            <a:r>
+              <a:rPr lang="en-GB" dirty="0" err="1"/>
+              <a:t>yyyy</a:t>
+            </a:r>
+            <a:r>
+              <a:rPr lang="en-GB" dirty="0"/>
+              <a:t>-mm-dd </a:t>
+            </a:r>
+            <a:r>
+              <a:rPr lang="en-GB" dirty="0" err="1"/>
+              <a:t>hh:mm</a:t>
+            </a:r>
+            <a:r>
+              <a:rPr lang="he-IL" dirty="0"/>
+              <a:t>"</a:t>
+            </a:r>
+            <a:endParaRPr lang="en-GB" dirty="0"/>
+          </a:p>
+          <a:p>
+            <a:pPr marL="285750" indent="-285750" algn="r" rtl="1">
+              <a:buFontTx/>
+              <a:buChar char="-"/>
+            </a:pPr>
+            <a:r>
+              <a:rPr lang="en-GB" dirty="0"/>
+              <a:t>bool</a:t>
+            </a:r>
+            <a:r>
+              <a:rPr lang="he-IL" dirty="0"/>
+              <a:t> – שיהווה האם המשתמש חסום או לא, מזהים על פי ה</a:t>
+            </a:r>
+            <a:r>
+              <a:rPr lang="en-GB" dirty="0" err="1"/>
+              <a:t>UserID</a:t>
+            </a:r>
             <a:r>
               <a:rPr lang="en-US" dirty="0"/>
-              <a:t>Login</a:t>
-            </a:r>
-          </a:p>
-        </p:txBody>
-      </p:sp>
-      <p:sp>
-        <p:nvSpPr>
-          <p:cNvPr id="7" name="Rectangle 6">
-            <a:extLst>
-              <a:ext uri="{FF2B5EF4-FFF2-40B4-BE49-F238E27FC236}">
-                <a16:creationId xmlns:a16="http://schemas.microsoft.com/office/drawing/2014/main" id="{E2132CCE-A8BD-45C1-8261-86521EF9AD9E}"/>
+              <a:t> </a:t>
+            </a:r>
+            <a:r>
+              <a:rPr lang="he-IL" dirty="0"/>
+              <a:t> </a:t>
+            </a:r>
+            <a:r>
+              <a:rPr lang="he-IL" dirty="0" err="1"/>
+              <a:t>מהפייסבוק</a:t>
+            </a:r>
+            <a:endParaRPr lang="en-US" dirty="0"/>
+          </a:p>
+          <a:p>
+            <a:pPr marL="285750" indent="-285750" algn="r" rtl="1">
+              <a:buFontTx/>
+              <a:buChar char="-"/>
+            </a:pPr>
+            <a:r>
+              <a:rPr lang="en-US" dirty="0"/>
+              <a:t>bool</a:t>
+            </a:r>
+            <a:r>
+              <a:rPr lang="he-IL" dirty="0"/>
+              <a:t> – האם המשתמש מתנדב או מנודב</a:t>
+            </a:r>
+          </a:p>
+          <a:p>
+            <a:pPr marL="285750" indent="-285750" algn="r" rtl="1">
+              <a:buFontTx/>
+              <a:buChar char="-"/>
+            </a:pPr>
+            <a:r>
+              <a:rPr lang="en-GB" dirty="0"/>
+              <a:t>bool</a:t>
+            </a:r>
+            <a:r>
+              <a:rPr lang="he-IL" dirty="0"/>
+              <a:t> - האם התראות מכובות או פועלות</a:t>
+            </a:r>
+            <a:endParaRPr lang="en-GB" dirty="0"/>
+          </a:p>
+          <a:p>
+            <a:pPr algn="r" rtl="1"/>
+            <a:endParaRPr lang="en-GB" dirty="0"/>
+          </a:p>
+        </p:txBody>
+      </p:sp>
+      <p:sp>
+        <p:nvSpPr>
+          <p:cNvPr id="8" name="Rectangle: Rounded Corners 7">
+            <a:extLst>
+              <a:ext uri="{FF2B5EF4-FFF2-40B4-BE49-F238E27FC236}">
+                <a16:creationId xmlns:a16="http://schemas.microsoft.com/office/drawing/2014/main" id="{A10D178E-41C8-4FCF-BC30-00E614ECE77C}"/>
               </a:ext>
             </a:extLst>
           </p:cNvPr>
@@ -11064,205 +12965,91 @@
         </p:nvSpPr>
         <p:spPr>
           <a:xfrm>
-            <a:off x="8056593" y="1155779"/>
-            <a:ext cx="2790334" cy="4926928"/>
-          </a:xfrm>
-          <a:prstGeom prst="rect">
+            <a:off x="1197754" y="4474346"/>
+            <a:ext cx="2211272" cy="1725628"/>
+          </a:xfrm>
+          <a:prstGeom prst="roundRect">
             <a:avLst/>
           </a:prstGeom>
           <a:solidFill>
             <a:srgbClr val="7030A0"/>
           </a:solidFill>
-          <a:ln w="28575">
+        </p:spPr>
+        <p:style>
+          <a:lnRef idx="0">
+            <a:schemeClr val="accent5"/>
+          </a:lnRef>
+          <a:fillRef idx="3">
+            <a:schemeClr val="accent5"/>
+          </a:fillRef>
+          <a:effectRef idx="3">
+            <a:schemeClr val="accent5"/>
+          </a:effectRef>
+          <a:fontRef idx="minor">
+            <a:schemeClr val="lt1"/>
+          </a:fontRef>
+        </p:style>
+        <p:txBody>
+          <a:bodyPr rtlCol="0" anchor="ctr"/>
+          <a:lstStyle/>
+          <a:p>
+            <a:pPr algn="ctr"/>
+            <a:r>
+              <a:rPr lang="he-IL" dirty="0"/>
+              <a:t>דרך סודית לפתיחת משתמש מתנדב</a:t>
+            </a:r>
+            <a:endParaRPr lang="en-US" dirty="0"/>
+          </a:p>
+        </p:txBody>
+      </p:sp>
+      <p:cxnSp>
+        <p:nvCxnSpPr>
+          <p:cNvPr id="11" name="Connector: Elbow 10">
+            <a:extLst>
+              <a:ext uri="{FF2B5EF4-FFF2-40B4-BE49-F238E27FC236}">
+                <a16:creationId xmlns:a16="http://schemas.microsoft.com/office/drawing/2014/main" id="{194795D6-F10F-4059-B918-0B5D58948BEF}"/>
+              </a:ext>
+            </a:extLst>
+          </p:cNvPr>
+          <p:cNvCxnSpPr>
+            <a:endCxn id="8" idx="3"/>
+          </p:cNvCxnSpPr>
+          <p:nvPr/>
+        </p:nvCxnSpPr>
+        <p:spPr>
+          <a:xfrm rot="10800000" flipV="1">
+            <a:off x="3409027" y="4092606"/>
+            <a:ext cx="3817397" cy="1244554"/>
+          </a:xfrm>
+          <a:prstGeom prst="bentConnector3">
+            <a:avLst/>
+          </a:prstGeom>
+          <a:ln w="38100">
             <a:solidFill>
               <a:schemeClr val="tx1"/>
             </a:solidFill>
+            <a:tailEnd type="triangle"/>
           </a:ln>
         </p:spPr>
         <p:style>
-          <a:lnRef idx="2">
-            <a:schemeClr val="accent1">
-              <a:shade val="50000"/>
-            </a:schemeClr>
+          <a:lnRef idx="1">
+            <a:schemeClr val="accent1"/>
           </a:lnRef>
-          <a:fillRef idx="1">
+          <a:fillRef idx="0">
             <a:schemeClr val="accent1"/>
           </a:fillRef>
           <a:effectRef idx="0">
             <a:schemeClr val="accent1"/>
           </a:effectRef>
           <a:fontRef idx="minor">
-            <a:schemeClr val="lt1"/>
+            <a:schemeClr val="tx1"/>
           </a:fontRef>
         </p:style>
-        <p:txBody>
-          <a:bodyPr rtlCol="0" anchor="ctr"/>
-          <a:lstStyle/>
-          <a:p>
-            <a:pPr algn="ctr"/>
-            <a:endParaRPr lang="en-US"/>
-          </a:p>
-        </p:txBody>
-      </p:sp>
-      <p:sp>
-        <p:nvSpPr>
-          <p:cNvPr id="11" name="TextBox 10">
-            <a:extLst>
-              <a:ext uri="{FF2B5EF4-FFF2-40B4-BE49-F238E27FC236}">
-                <a16:creationId xmlns:a16="http://schemas.microsoft.com/office/drawing/2014/main" id="{0AEA5B3E-55B4-4478-8DDF-223B6DCFE9EA}"/>
-              </a:ext>
-            </a:extLst>
-          </p:cNvPr>
-          <p:cNvSpPr txBox="1"/>
-          <p:nvPr/>
-        </p:nvSpPr>
-        <p:spPr>
-          <a:xfrm>
-            <a:off x="1006029" y="1722207"/>
-            <a:ext cx="6258757" cy="1200329"/>
-          </a:xfrm>
-          <a:prstGeom prst="rect">
-            <a:avLst/>
-          </a:prstGeom>
-          <a:noFill/>
-        </p:spPr>
-        <p:txBody>
-          <a:bodyPr wrap="square" rtlCol="0">
-            <a:spAutoFit/>
-          </a:bodyPr>
-          <a:lstStyle/>
-          <a:p>
-            <a:pPr algn="r" rtl="1"/>
-            <a:r>
-              <a:rPr lang="he-IL" dirty="0"/>
-              <a:t>פונקציונליות:</a:t>
-            </a:r>
-            <a:endParaRPr lang="en-US" dirty="0"/>
-          </a:p>
-          <a:p>
-            <a:pPr algn="r" rtl="1"/>
-            <a:r>
-              <a:rPr lang="he-IL" dirty="0"/>
-              <a:t> - התחברות ע"י פייסבוק</a:t>
-            </a:r>
-          </a:p>
-          <a:p>
-            <a:pPr algn="r" rtl="1"/>
-            <a:r>
-              <a:rPr lang="he-IL" dirty="0"/>
-              <a:t> - אם יוזר קיים: לחבר אותו, ואז לשלוח אותו לדף שלו</a:t>
-            </a:r>
-          </a:p>
-          <a:p>
-            <a:pPr algn="r" rtl="1"/>
-            <a:r>
-              <a:rPr lang="he-IL" dirty="0"/>
-              <a:t> - אם יוזר לא קיים, לשלוח אותו </a:t>
-            </a:r>
-            <a:r>
-              <a:rPr lang="he-IL" b="1" dirty="0"/>
-              <a:t>לדף הרשמה</a:t>
-            </a:r>
-          </a:p>
-        </p:txBody>
-      </p:sp>
-      <p:sp>
-        <p:nvSpPr>
-          <p:cNvPr id="12" name="Rectangle 11">
-            <a:extLst>
-              <a:ext uri="{FF2B5EF4-FFF2-40B4-BE49-F238E27FC236}">
-                <a16:creationId xmlns:a16="http://schemas.microsoft.com/office/drawing/2014/main" id="{CE55A255-2862-4F24-AAAE-F8676B64E167}"/>
-              </a:ext>
-            </a:extLst>
-          </p:cNvPr>
-          <p:cNvSpPr/>
-          <p:nvPr/>
-        </p:nvSpPr>
-        <p:spPr>
-          <a:xfrm>
-            <a:off x="8393414" y="4652884"/>
-            <a:ext cx="2201662" cy="423909"/>
-          </a:xfrm>
-          <a:prstGeom prst="rect">
-            <a:avLst/>
-          </a:prstGeom>
-          <a:solidFill>
-            <a:schemeClr val="accent1"/>
-          </a:solidFill>
-          <a:ln>
-            <a:noFill/>
-          </a:ln>
-        </p:spPr>
-        <p:style>
-          <a:lnRef idx="3">
-            <a:schemeClr val="lt1"/>
-          </a:lnRef>
-          <a:fillRef idx="1">
-            <a:schemeClr val="accent6"/>
-          </a:fillRef>
-          <a:effectRef idx="1">
-            <a:schemeClr val="accent6"/>
-          </a:effectRef>
-          <a:fontRef idx="minor">
-            <a:schemeClr val="lt1"/>
-          </a:fontRef>
-        </p:style>
-        <p:txBody>
-          <a:bodyPr rtlCol="0" anchor="ctr"/>
-          <a:lstStyle/>
-          <a:p>
-            <a:pPr algn="ctr" rtl="1"/>
-            <a:r>
-              <a:rPr lang="he-IL" dirty="0"/>
-              <a:t>התחבר </a:t>
-            </a:r>
-            <a:r>
-              <a:rPr lang="en-US" dirty="0"/>
-              <a:t>(F)</a:t>
-            </a:r>
-          </a:p>
-        </p:txBody>
-      </p:sp>
-      <p:pic>
-        <p:nvPicPr>
-          <p:cNvPr id="8" name="Picture 7" descr="A close up of a sign&#10;&#10;Description automatically generated">
-            <a:extLst>
-              <a:ext uri="{FF2B5EF4-FFF2-40B4-BE49-F238E27FC236}">
-                <a16:creationId xmlns:a16="http://schemas.microsoft.com/office/drawing/2014/main" id="{F24DA01A-80AC-4B01-956B-14338C542433}"/>
-              </a:ext>
-            </a:extLst>
-          </p:cNvPr>
-          <p:cNvPicPr>
-            <a:picLocks noChangeAspect="1"/>
-          </p:cNvPicPr>
-          <p:nvPr/>
-        </p:nvPicPr>
-        <p:blipFill>
-          <a:blip r:embed="rId2">
-            <a:extLst>
-              <a:ext uri="{28A0092B-C50C-407E-A947-70E740481C1C}">
-                <a14:useLocalDpi xmlns:a14="http://schemas.microsoft.com/office/drawing/2010/main" val="0"/>
-              </a:ext>
-            </a:extLst>
-          </a:blip>
-          <a:stretch>
-            <a:fillRect/>
-          </a:stretch>
-        </p:blipFill>
-        <p:spPr>
-          <a:xfrm>
-            <a:off x="8393414" y="1549586"/>
-            <a:ext cx="1981093" cy="1981093"/>
-          </a:xfrm>
-          <a:prstGeom prst="rect">
-            <a:avLst/>
-          </a:prstGeom>
-        </p:spPr>
-      </p:pic>
+      </p:cxnSp>
     </p:spTree>
     <p:extLst>
       <p:ext uri="{BB962C8B-B14F-4D97-AF65-F5344CB8AC3E}">
-        <p14:creationId xmlns:p14="http://schemas.microsoft.com/office/powerpoint/2010/main" val="3597118904"/>
+        <p14:creationId xmlns:p14="http://schemas.microsoft.com/office/powerpoint/2010/main" val="375735006"/>
       </p:ext>
     </p:extLst>
   </p:cSld>

</xml_diff>